<commit_message>
CISC 897 Final Survey - Wrote two more pages, 3 more to go
</commit_message>
<xml_diff>
--- a/CISC897/FinalSurvey/Paper/Images/ImageGeneration.pptx
+++ b/CISC897/FinalSurvey/Paper/Images/ImageGeneration.pptx
@@ -247,7 +247,7 @@
           <a:p>
             <a:fld id="{B0391C92-2A1D-4281-A91D-582B82F483F6}" type="datetimeFigureOut">
               <a:rPr lang="en-CA" smtClean="0"/>
-              <a:t>20/11/2016</a:t>
+              <a:t>21/11/2016</a:t>
             </a:fld>
             <a:endParaRPr lang="en-CA"/>
           </a:p>
@@ -417,7 +417,7 @@
           <a:p>
             <a:fld id="{B0391C92-2A1D-4281-A91D-582B82F483F6}" type="datetimeFigureOut">
               <a:rPr lang="en-CA" smtClean="0"/>
-              <a:t>20/11/2016</a:t>
+              <a:t>21/11/2016</a:t>
             </a:fld>
             <a:endParaRPr lang="en-CA"/>
           </a:p>
@@ -597,7 +597,7 @@
           <a:p>
             <a:fld id="{B0391C92-2A1D-4281-A91D-582B82F483F6}" type="datetimeFigureOut">
               <a:rPr lang="en-CA" smtClean="0"/>
-              <a:t>20/11/2016</a:t>
+              <a:t>21/11/2016</a:t>
             </a:fld>
             <a:endParaRPr lang="en-CA"/>
           </a:p>
@@ -767,7 +767,7 @@
           <a:p>
             <a:fld id="{B0391C92-2A1D-4281-A91D-582B82F483F6}" type="datetimeFigureOut">
               <a:rPr lang="en-CA" smtClean="0"/>
-              <a:t>20/11/2016</a:t>
+              <a:t>21/11/2016</a:t>
             </a:fld>
             <a:endParaRPr lang="en-CA"/>
           </a:p>
@@ -1013,7 +1013,7 @@
           <a:p>
             <a:fld id="{B0391C92-2A1D-4281-A91D-582B82F483F6}" type="datetimeFigureOut">
               <a:rPr lang="en-CA" smtClean="0"/>
-              <a:t>20/11/2016</a:t>
+              <a:t>21/11/2016</a:t>
             </a:fld>
             <a:endParaRPr lang="en-CA"/>
           </a:p>
@@ -1245,7 +1245,7 @@
           <a:p>
             <a:fld id="{B0391C92-2A1D-4281-A91D-582B82F483F6}" type="datetimeFigureOut">
               <a:rPr lang="en-CA" smtClean="0"/>
-              <a:t>20/11/2016</a:t>
+              <a:t>21/11/2016</a:t>
             </a:fld>
             <a:endParaRPr lang="en-CA"/>
           </a:p>
@@ -1612,7 +1612,7 @@
           <a:p>
             <a:fld id="{B0391C92-2A1D-4281-A91D-582B82F483F6}" type="datetimeFigureOut">
               <a:rPr lang="en-CA" smtClean="0"/>
-              <a:t>20/11/2016</a:t>
+              <a:t>21/11/2016</a:t>
             </a:fld>
             <a:endParaRPr lang="en-CA"/>
           </a:p>
@@ -1730,7 +1730,7 @@
           <a:p>
             <a:fld id="{B0391C92-2A1D-4281-A91D-582B82F483F6}" type="datetimeFigureOut">
               <a:rPr lang="en-CA" smtClean="0"/>
-              <a:t>20/11/2016</a:t>
+              <a:t>21/11/2016</a:t>
             </a:fld>
             <a:endParaRPr lang="en-CA"/>
           </a:p>
@@ -1825,7 +1825,7 @@
           <a:p>
             <a:fld id="{B0391C92-2A1D-4281-A91D-582B82F483F6}" type="datetimeFigureOut">
               <a:rPr lang="en-CA" smtClean="0"/>
-              <a:t>20/11/2016</a:t>
+              <a:t>21/11/2016</a:t>
             </a:fld>
             <a:endParaRPr lang="en-CA"/>
           </a:p>
@@ -2102,7 +2102,7 @@
           <a:p>
             <a:fld id="{B0391C92-2A1D-4281-A91D-582B82F483F6}" type="datetimeFigureOut">
               <a:rPr lang="en-CA" smtClean="0"/>
-              <a:t>20/11/2016</a:t>
+              <a:t>21/11/2016</a:t>
             </a:fld>
             <a:endParaRPr lang="en-CA"/>
           </a:p>
@@ -2355,7 +2355,7 @@
           <a:p>
             <a:fld id="{B0391C92-2A1D-4281-A91D-582B82F483F6}" type="datetimeFigureOut">
               <a:rPr lang="en-CA" smtClean="0"/>
-              <a:t>20/11/2016</a:t>
+              <a:t>21/11/2016</a:t>
             </a:fld>
             <a:endParaRPr lang="en-CA"/>
           </a:p>
@@ -2568,7 +2568,7 @@
           <a:p>
             <a:fld id="{B0391C92-2A1D-4281-A91D-582B82F483F6}" type="datetimeFigureOut">
               <a:rPr lang="en-CA" smtClean="0"/>
-              <a:t>20/11/2016</a:t>
+              <a:t>21/11/2016</a:t>
             </a:fld>
             <a:endParaRPr lang="en-CA"/>
           </a:p>
@@ -4369,7 +4369,7 @@
       </p:grpSpPr>
       <p:grpSp>
         <p:nvGrpSpPr>
-          <p:cNvPr id="16" name="Group 15"/>
+          <p:cNvPr id="7" name="Group 6"/>
           <p:cNvGrpSpPr/>
           <p:nvPr/>
         </p:nvGrpSpPr>
@@ -4383,7 +4383,7 @@
         </p:grpSpPr>
         <p:grpSp>
           <p:nvGrpSpPr>
-            <p:cNvPr id="13" name="Group 12"/>
+            <p:cNvPr id="16" name="Group 15"/>
             <p:cNvGrpSpPr/>
             <p:nvPr/>
           </p:nvGrpSpPr>
@@ -4397,69 +4397,568 @@
           </p:grpSpPr>
           <p:grpSp>
             <p:nvGrpSpPr>
-              <p:cNvPr id="10" name="Group 9"/>
+              <p:cNvPr id="13" name="Group 12"/>
               <p:cNvGrpSpPr/>
               <p:nvPr/>
             </p:nvGrpSpPr>
             <p:grpSpPr>
               <a:xfrm>
                 <a:off x="2379644" y="249194"/>
-                <a:ext cx="7733840" cy="6608806"/>
-                <a:chOff x="2236425" y="-406310"/>
-                <a:chExt cx="7733840" cy="6608806"/>
+                <a:ext cx="7866042" cy="6608806"/>
+                <a:chOff x="2379644" y="249194"/>
+                <a:chExt cx="7866042" cy="6608806"/>
               </a:xfrm>
             </p:grpSpPr>
-            <p:pic>
-              <p:nvPicPr>
-                <p:cNvPr id="4" name="Picture 3"/>
-                <p:cNvPicPr>
-                  <a:picLocks noChangeAspect="1"/>
-                </p:cNvPicPr>
+            <p:grpSp>
+              <p:nvGrpSpPr>
+                <p:cNvPr id="10" name="Group 9"/>
+                <p:cNvGrpSpPr/>
                 <p:nvPr/>
-              </p:nvPicPr>
-              <p:blipFill rotWithShape="1">
-                <a:blip r:embed="rId2">
-                  <a:extLst>
-                    <a:ext uri="{28A0092B-C50C-407E-A947-70E740481C1C}">
-                      <a14:useLocalDpi xmlns:a14="http://schemas.microsoft.com/office/drawing/2010/main" val="0"/>
-                    </a:ext>
-                  </a:extLst>
-                </a:blip>
-                <a:srcRect l="2570" t="3202" r="5429" b="733"/>
-                <a:stretch/>
-              </p:blipFill>
-              <p:spPr>
+              </p:nvGrpSpPr>
+              <p:grpSpPr>
                 <a:xfrm>
-                  <a:off x="2236425" y="-385590"/>
-                  <a:ext cx="7733840" cy="6588086"/>
+                  <a:off x="2379644" y="249194"/>
+                  <a:ext cx="7733840" cy="6608806"/>
+                  <a:chOff x="2236425" y="-406310"/>
+                  <a:chExt cx="7733840" cy="6608806"/>
                 </a:xfrm>
-                <a:prstGeom prst="rect">
-                  <a:avLst/>
-                </a:prstGeom>
-              </p:spPr>
-            </p:pic>
+              </p:grpSpPr>
+              <p:pic>
+                <p:nvPicPr>
+                  <p:cNvPr id="4" name="Picture 3"/>
+                  <p:cNvPicPr>
+                    <a:picLocks noChangeAspect="1"/>
+                  </p:cNvPicPr>
+                  <p:nvPr/>
+                </p:nvPicPr>
+                <p:blipFill rotWithShape="1">
+                  <a:blip r:embed="rId2">
+                    <a:extLst>
+                      <a:ext uri="{28A0092B-C50C-407E-A947-70E740481C1C}">
+                        <a14:useLocalDpi xmlns:a14="http://schemas.microsoft.com/office/drawing/2010/main" val="0"/>
+                      </a:ext>
+                    </a:extLst>
+                  </a:blip>
+                  <a:srcRect l="2570" t="3202" r="5429" b="733"/>
+                  <a:stretch/>
+                </p:blipFill>
+                <p:spPr>
+                  <a:xfrm>
+                    <a:off x="2236425" y="-385590"/>
+                    <a:ext cx="7733840" cy="6588086"/>
+                  </a:xfrm>
+                  <a:prstGeom prst="rect">
+                    <a:avLst/>
+                  </a:prstGeom>
+                </p:spPr>
+              </p:pic>
+              <p:sp>
+                <p:nvSpPr>
+                  <p:cNvPr id="5" name="Freeform 4"/>
+                  <p:cNvSpPr/>
+                  <p:nvPr/>
+                </p:nvSpPr>
+                <p:spPr>
+                  <a:xfrm>
+                    <a:off x="4201836" y="3721608"/>
+                    <a:ext cx="629760" cy="1225296"/>
+                  </a:xfrm>
+                  <a:custGeom>
+                    <a:avLst/>
+                    <a:gdLst>
+                      <a:gd name="connsiteX0" fmla="*/ 242148 w 629760"/>
+                      <a:gd name="connsiteY0" fmla="*/ 0 h 1225296"/>
+                      <a:gd name="connsiteX1" fmla="*/ 626196 w 629760"/>
+                      <a:gd name="connsiteY1" fmla="*/ 996696 h 1225296"/>
+                      <a:gd name="connsiteX2" fmla="*/ 40980 w 629760"/>
+                      <a:gd name="connsiteY2" fmla="*/ 795528 h 1225296"/>
+                      <a:gd name="connsiteX3" fmla="*/ 95844 w 629760"/>
+                      <a:gd name="connsiteY3" fmla="*/ 1225296 h 1225296"/>
+                    </a:gdLst>
+                    <a:ahLst/>
+                    <a:cxnLst>
+                      <a:cxn ang="0">
+                        <a:pos x="connsiteX0" y="connsiteY0"/>
+                      </a:cxn>
+                      <a:cxn ang="0">
+                        <a:pos x="connsiteX1" y="connsiteY1"/>
+                      </a:cxn>
+                      <a:cxn ang="0">
+                        <a:pos x="connsiteX2" y="connsiteY2"/>
+                      </a:cxn>
+                      <a:cxn ang="0">
+                        <a:pos x="connsiteX3" y="connsiteY3"/>
+                      </a:cxn>
+                    </a:cxnLst>
+                    <a:rect l="l" t="t" r="r" b="b"/>
+                    <a:pathLst>
+                      <a:path w="629760" h="1225296">
+                        <a:moveTo>
+                          <a:pt x="242148" y="0"/>
+                        </a:moveTo>
+                        <a:cubicBezTo>
+                          <a:pt x="450936" y="432054"/>
+                          <a:pt x="659724" y="864108"/>
+                          <a:pt x="626196" y="996696"/>
+                        </a:cubicBezTo>
+                        <a:cubicBezTo>
+                          <a:pt x="592668" y="1129284"/>
+                          <a:pt x="129372" y="757428"/>
+                          <a:pt x="40980" y="795528"/>
+                        </a:cubicBezTo>
+                        <a:cubicBezTo>
+                          <a:pt x="-47412" y="833628"/>
+                          <a:pt x="24216" y="1029462"/>
+                          <a:pt x="95844" y="1225296"/>
+                        </a:cubicBezTo>
+                      </a:path>
+                    </a:pathLst>
+                  </a:custGeom>
+                  <a:noFill/>
+                  <a:ln w="57150">
+                    <a:solidFill>
+                      <a:srgbClr val="FF0000"/>
+                    </a:solidFill>
+                    <a:headEnd type="oval"/>
+                  </a:ln>
+                </p:spPr>
+                <p:style>
+                  <a:lnRef idx="2">
+                    <a:schemeClr val="accent1">
+                      <a:shade val="50000"/>
+                    </a:schemeClr>
+                  </a:lnRef>
+                  <a:fillRef idx="1">
+                    <a:schemeClr val="accent1"/>
+                  </a:fillRef>
+                  <a:effectRef idx="0">
+                    <a:schemeClr val="accent1"/>
+                  </a:effectRef>
+                  <a:fontRef idx="minor">
+                    <a:schemeClr val="lt1"/>
+                  </a:fontRef>
+                </p:style>
+                <p:txBody>
+                  <a:bodyPr rtlCol="0" anchor="ctr"/>
+                  <a:lstStyle/>
+                  <a:p>
+                    <a:pPr algn="ctr"/>
+                    <a:endParaRPr lang="en-CA"/>
+                  </a:p>
+                </p:txBody>
+              </p:sp>
+              <p:sp>
+                <p:nvSpPr>
+                  <p:cNvPr id="6" name="TextBox 5"/>
+                  <p:cNvSpPr txBox="1"/>
+                  <p:nvPr/>
+                </p:nvSpPr>
+                <p:spPr>
+                  <a:xfrm>
+                    <a:off x="3595527" y="4837220"/>
+                    <a:ext cx="2200338" cy="1200329"/>
+                  </a:xfrm>
+                  <a:prstGeom prst="rect">
+                    <a:avLst/>
+                  </a:prstGeom>
+                  <a:noFill/>
+                </p:spPr>
+                <p:txBody>
+                  <a:bodyPr wrap="square" rtlCol="0">
+                    <a:spAutoFit/>
+                  </a:bodyPr>
+                  <a:lstStyle/>
+                  <a:p>
+                    <a:r>
+                      <a:rPr lang="en-CA" sz="3600" dirty="0" smtClean="0">
+                        <a:solidFill>
+                          <a:srgbClr val="FF0000"/>
+                        </a:solidFill>
+                      </a:rPr>
+                      <a:t>Transverse process</a:t>
+                    </a:r>
+                    <a:endParaRPr lang="en-CA" sz="3600" dirty="0">
+                      <a:solidFill>
+                        <a:srgbClr val="FF0000"/>
+                      </a:solidFill>
+                    </a:endParaRPr>
+                  </a:p>
+                </p:txBody>
+              </p:sp>
+              <p:sp>
+                <p:nvSpPr>
+                  <p:cNvPr id="8" name="TextBox 7"/>
+                  <p:cNvSpPr txBox="1"/>
+                  <p:nvPr/>
+                </p:nvSpPr>
+                <p:spPr>
+                  <a:xfrm>
+                    <a:off x="2401477" y="-406310"/>
+                    <a:ext cx="2115239" cy="1754326"/>
+                  </a:xfrm>
+                  <a:prstGeom prst="rect">
+                    <a:avLst/>
+                  </a:prstGeom>
+                  <a:noFill/>
+                </p:spPr>
+                <p:txBody>
+                  <a:bodyPr wrap="square" rtlCol="0">
+                    <a:spAutoFit/>
+                  </a:bodyPr>
+                  <a:lstStyle/>
+                  <a:p>
+                    <a:r>
+                      <a:rPr lang="en-CA" sz="3600" dirty="0" smtClean="0">
+                        <a:solidFill>
+                          <a:srgbClr val="00B0F0"/>
+                        </a:solidFill>
+                      </a:rPr>
+                      <a:t>Superior vertebral endplate</a:t>
+                    </a:r>
+                    <a:endParaRPr lang="en-CA" sz="3600" dirty="0">
+                      <a:solidFill>
+                        <a:srgbClr val="00B0F0"/>
+                      </a:solidFill>
+                    </a:endParaRPr>
+                  </a:p>
+                </p:txBody>
+              </p:sp>
+              <p:sp>
+                <p:nvSpPr>
+                  <p:cNvPr id="9" name="Freeform 8"/>
+                  <p:cNvSpPr/>
+                  <p:nvPr/>
+                </p:nvSpPr>
+                <p:spPr>
+                  <a:xfrm>
+                    <a:off x="3205908" y="1293195"/>
+                    <a:ext cx="1641513" cy="689845"/>
+                  </a:xfrm>
+                  <a:custGeom>
+                    <a:avLst/>
+                    <a:gdLst>
+                      <a:gd name="connsiteX0" fmla="*/ 1663547 w 1663547"/>
+                      <a:gd name="connsiteY0" fmla="*/ 198303 h 606268"/>
+                      <a:gd name="connsiteX1" fmla="*/ 936434 w 1663547"/>
+                      <a:gd name="connsiteY1" fmla="*/ 88135 h 606268"/>
+                      <a:gd name="connsiteX2" fmla="*/ 903383 w 1663547"/>
+                      <a:gd name="connsiteY2" fmla="*/ 605928 h 606268"/>
+                      <a:gd name="connsiteX3" fmla="*/ 0 w 1663547"/>
+                      <a:gd name="connsiteY3" fmla="*/ 0 h 606268"/>
+                      <a:gd name="connsiteX0" fmla="*/ 1784732 w 1784732"/>
+                      <a:gd name="connsiteY0" fmla="*/ 99151 h 606281"/>
+                      <a:gd name="connsiteX1" fmla="*/ 936434 w 1784732"/>
+                      <a:gd name="connsiteY1" fmla="*/ 88135 h 606281"/>
+                      <a:gd name="connsiteX2" fmla="*/ 903383 w 1784732"/>
+                      <a:gd name="connsiteY2" fmla="*/ 605928 h 606281"/>
+                      <a:gd name="connsiteX3" fmla="*/ 0 w 1784732"/>
+                      <a:gd name="connsiteY3" fmla="*/ 0 h 606281"/>
+                      <a:gd name="connsiteX0" fmla="*/ 1784732 w 1784732"/>
+                      <a:gd name="connsiteY0" fmla="*/ 99151 h 606281"/>
+                      <a:gd name="connsiteX1" fmla="*/ 936434 w 1784732"/>
+                      <a:gd name="connsiteY1" fmla="*/ 88135 h 606281"/>
+                      <a:gd name="connsiteX2" fmla="*/ 903383 w 1784732"/>
+                      <a:gd name="connsiteY2" fmla="*/ 605928 h 606281"/>
+                      <a:gd name="connsiteX3" fmla="*/ 0 w 1784732"/>
+                      <a:gd name="connsiteY3" fmla="*/ 0 h 606281"/>
+                      <a:gd name="connsiteX0" fmla="*/ 1784732 w 1784732"/>
+                      <a:gd name="connsiteY0" fmla="*/ 99151 h 606281"/>
+                      <a:gd name="connsiteX1" fmla="*/ 936434 w 1784732"/>
+                      <a:gd name="connsiteY1" fmla="*/ 88135 h 606281"/>
+                      <a:gd name="connsiteX2" fmla="*/ 903383 w 1784732"/>
+                      <a:gd name="connsiteY2" fmla="*/ 605928 h 606281"/>
+                      <a:gd name="connsiteX3" fmla="*/ 0 w 1784732"/>
+                      <a:gd name="connsiteY3" fmla="*/ 0 h 606281"/>
+                      <a:gd name="connsiteX0" fmla="*/ 1784732 w 1784732"/>
+                      <a:gd name="connsiteY0" fmla="*/ 99151 h 606281"/>
+                      <a:gd name="connsiteX1" fmla="*/ 936434 w 1784732"/>
+                      <a:gd name="connsiteY1" fmla="*/ 88135 h 606281"/>
+                      <a:gd name="connsiteX2" fmla="*/ 903383 w 1784732"/>
+                      <a:gd name="connsiteY2" fmla="*/ 605928 h 606281"/>
+                      <a:gd name="connsiteX3" fmla="*/ 0 w 1784732"/>
+                      <a:gd name="connsiteY3" fmla="*/ 0 h 606281"/>
+                      <a:gd name="connsiteX0" fmla="*/ 1729648 w 1729648"/>
+                      <a:gd name="connsiteY0" fmla="*/ 121185 h 628506"/>
+                      <a:gd name="connsiteX1" fmla="*/ 881350 w 1729648"/>
+                      <a:gd name="connsiteY1" fmla="*/ 110169 h 628506"/>
+                      <a:gd name="connsiteX2" fmla="*/ 848299 w 1729648"/>
+                      <a:gd name="connsiteY2" fmla="*/ 627962 h 628506"/>
+                      <a:gd name="connsiteX3" fmla="*/ 0 w 1729648"/>
+                      <a:gd name="connsiteY3" fmla="*/ 0 h 628506"/>
+                      <a:gd name="connsiteX0" fmla="*/ 1729648 w 1729648"/>
+                      <a:gd name="connsiteY0" fmla="*/ 121185 h 628506"/>
+                      <a:gd name="connsiteX1" fmla="*/ 881350 w 1729648"/>
+                      <a:gd name="connsiteY1" fmla="*/ 110169 h 628506"/>
+                      <a:gd name="connsiteX2" fmla="*/ 848299 w 1729648"/>
+                      <a:gd name="connsiteY2" fmla="*/ 627962 h 628506"/>
+                      <a:gd name="connsiteX3" fmla="*/ 0 w 1729648"/>
+                      <a:gd name="connsiteY3" fmla="*/ 0 h 628506"/>
+                      <a:gd name="connsiteX0" fmla="*/ 1729648 w 1729648"/>
+                      <a:gd name="connsiteY0" fmla="*/ 121185 h 628506"/>
+                      <a:gd name="connsiteX1" fmla="*/ 881350 w 1729648"/>
+                      <a:gd name="connsiteY1" fmla="*/ 110169 h 628506"/>
+                      <a:gd name="connsiteX2" fmla="*/ 848299 w 1729648"/>
+                      <a:gd name="connsiteY2" fmla="*/ 627962 h 628506"/>
+                      <a:gd name="connsiteX3" fmla="*/ 0 w 1729648"/>
+                      <a:gd name="connsiteY3" fmla="*/ 0 h 628506"/>
+                      <a:gd name="connsiteX0" fmla="*/ 1729648 w 1729648"/>
+                      <a:gd name="connsiteY0" fmla="*/ 121185 h 661525"/>
+                      <a:gd name="connsiteX1" fmla="*/ 881350 w 1729648"/>
+                      <a:gd name="connsiteY1" fmla="*/ 110169 h 661525"/>
+                      <a:gd name="connsiteX2" fmla="*/ 561861 w 1729648"/>
+                      <a:gd name="connsiteY2" fmla="*/ 661012 h 661525"/>
+                      <a:gd name="connsiteX3" fmla="*/ 0 w 1729648"/>
+                      <a:gd name="connsiteY3" fmla="*/ 0 h 661525"/>
+                      <a:gd name="connsiteX0" fmla="*/ 1729648 w 1729648"/>
+                      <a:gd name="connsiteY0" fmla="*/ 121185 h 664232"/>
+                      <a:gd name="connsiteX1" fmla="*/ 881350 w 1729648"/>
+                      <a:gd name="connsiteY1" fmla="*/ 110169 h 664232"/>
+                      <a:gd name="connsiteX2" fmla="*/ 561861 w 1729648"/>
+                      <a:gd name="connsiteY2" fmla="*/ 661012 h 664232"/>
+                      <a:gd name="connsiteX3" fmla="*/ 0 w 1729648"/>
+                      <a:gd name="connsiteY3" fmla="*/ 0 h 664232"/>
+                      <a:gd name="connsiteX0" fmla="*/ 1729648 w 1729648"/>
+                      <a:gd name="connsiteY0" fmla="*/ 121185 h 662467"/>
+                      <a:gd name="connsiteX1" fmla="*/ 936434 w 1729648"/>
+                      <a:gd name="connsiteY1" fmla="*/ 176270 h 662467"/>
+                      <a:gd name="connsiteX2" fmla="*/ 561861 w 1729648"/>
+                      <a:gd name="connsiteY2" fmla="*/ 661012 h 662467"/>
+                      <a:gd name="connsiteX3" fmla="*/ 0 w 1729648"/>
+                      <a:gd name="connsiteY3" fmla="*/ 0 h 662467"/>
+                      <a:gd name="connsiteX0" fmla="*/ 1729648 w 1729648"/>
+                      <a:gd name="connsiteY0" fmla="*/ 134443 h 674274"/>
+                      <a:gd name="connsiteX1" fmla="*/ 958468 w 1729648"/>
+                      <a:gd name="connsiteY1" fmla="*/ 24275 h 674274"/>
+                      <a:gd name="connsiteX2" fmla="*/ 561861 w 1729648"/>
+                      <a:gd name="connsiteY2" fmla="*/ 674270 h 674274"/>
+                      <a:gd name="connsiteX3" fmla="*/ 0 w 1729648"/>
+                      <a:gd name="connsiteY3" fmla="*/ 13258 h 674274"/>
+                      <a:gd name="connsiteX0" fmla="*/ 1641513 w 1641513"/>
+                      <a:gd name="connsiteY0" fmla="*/ 182173 h 666920"/>
+                      <a:gd name="connsiteX1" fmla="*/ 958468 w 1641513"/>
+                      <a:gd name="connsiteY1" fmla="*/ 16921 h 666920"/>
+                      <a:gd name="connsiteX2" fmla="*/ 561861 w 1641513"/>
+                      <a:gd name="connsiteY2" fmla="*/ 666916 h 666920"/>
+                      <a:gd name="connsiteX3" fmla="*/ 0 w 1641513"/>
+                      <a:gd name="connsiteY3" fmla="*/ 5904 h 666920"/>
+                      <a:gd name="connsiteX0" fmla="*/ 1641513 w 1641513"/>
+                      <a:gd name="connsiteY0" fmla="*/ 205098 h 689845"/>
+                      <a:gd name="connsiteX1" fmla="*/ 958468 w 1641513"/>
+                      <a:gd name="connsiteY1" fmla="*/ 39846 h 689845"/>
+                      <a:gd name="connsiteX2" fmla="*/ 561861 w 1641513"/>
+                      <a:gd name="connsiteY2" fmla="*/ 689841 h 689845"/>
+                      <a:gd name="connsiteX3" fmla="*/ 0 w 1641513"/>
+                      <a:gd name="connsiteY3" fmla="*/ 28829 h 689845"/>
+                    </a:gdLst>
+                    <a:ahLst/>
+                    <a:cxnLst>
+                      <a:cxn ang="0">
+                        <a:pos x="connsiteX0" y="connsiteY0"/>
+                      </a:cxn>
+                      <a:cxn ang="0">
+                        <a:pos x="connsiteX1" y="connsiteY1"/>
+                      </a:cxn>
+                      <a:cxn ang="0">
+                        <a:pos x="connsiteX2" y="connsiteY2"/>
+                      </a:cxn>
+                      <a:cxn ang="0">
+                        <a:pos x="connsiteX3" y="connsiteY3"/>
+                      </a:cxn>
+                    </a:cxnLst>
+                    <a:rect l="l" t="t" r="r" b="b"/>
+                    <a:pathLst>
+                      <a:path w="1641513" h="689845">
+                        <a:moveTo>
+                          <a:pt x="1641513" y="205098"/>
+                        </a:moveTo>
+                        <a:cubicBezTo>
+                          <a:pt x="1319270" y="-5140"/>
+                          <a:pt x="1138410" y="-40945"/>
+                          <a:pt x="958468" y="39846"/>
+                        </a:cubicBezTo>
+                        <a:cubicBezTo>
+                          <a:pt x="778526" y="120637"/>
+                          <a:pt x="721606" y="691677"/>
+                          <a:pt x="561861" y="689841"/>
+                        </a:cubicBezTo>
+                        <a:cubicBezTo>
+                          <a:pt x="402116" y="688005"/>
+                          <a:pt x="43149" y="445633"/>
+                          <a:pt x="0" y="28829"/>
+                        </a:cubicBezTo>
+                      </a:path>
+                    </a:pathLst>
+                  </a:custGeom>
+                  <a:noFill/>
+                  <a:ln w="57150">
+                    <a:solidFill>
+                      <a:srgbClr val="00B0F0"/>
+                    </a:solidFill>
+                    <a:headEnd type="oval"/>
+                  </a:ln>
+                </p:spPr>
+                <p:style>
+                  <a:lnRef idx="2">
+                    <a:schemeClr val="accent1">
+                      <a:shade val="50000"/>
+                    </a:schemeClr>
+                  </a:lnRef>
+                  <a:fillRef idx="1">
+                    <a:schemeClr val="accent1"/>
+                  </a:fillRef>
+                  <a:effectRef idx="0">
+                    <a:schemeClr val="accent1"/>
+                  </a:effectRef>
+                  <a:fontRef idx="minor">
+                    <a:schemeClr val="lt1"/>
+                  </a:fontRef>
+                </p:style>
+                <p:txBody>
+                  <a:bodyPr rtlCol="0" anchor="ctr"/>
+                  <a:lstStyle/>
+                  <a:p>
+                    <a:pPr algn="ctr"/>
+                    <a:endParaRPr lang="en-CA"/>
+                  </a:p>
+                </p:txBody>
+              </p:sp>
+            </p:grpSp>
             <p:sp>
               <p:nvSpPr>
-                <p:cNvPr id="5" name="Freeform 4"/>
+                <p:cNvPr id="11" name="Freeform 10"/>
                 <p:cNvSpPr/>
                 <p:nvPr/>
               </p:nvSpPr>
               <p:spPr>
                 <a:xfrm>
-                  <a:off x="4201836" y="3721608"/>
-                  <a:ext cx="629760" cy="1225296"/>
+                  <a:off x="6830458" y="1344057"/>
+                  <a:ext cx="1465243" cy="914401"/>
                 </a:xfrm>
                 <a:custGeom>
                   <a:avLst/>
                   <a:gdLst>
-                    <a:gd name="connsiteX0" fmla="*/ 242148 w 629760"/>
-                    <a:gd name="connsiteY0" fmla="*/ 0 h 1225296"/>
-                    <a:gd name="connsiteX1" fmla="*/ 626196 w 629760"/>
-                    <a:gd name="connsiteY1" fmla="*/ 996696 h 1225296"/>
-                    <a:gd name="connsiteX2" fmla="*/ 40980 w 629760"/>
-                    <a:gd name="connsiteY2" fmla="*/ 795528 h 1225296"/>
-                    <a:gd name="connsiteX3" fmla="*/ 95844 w 629760"/>
-                    <a:gd name="connsiteY3" fmla="*/ 1225296 h 1225296"/>
+                    <a:gd name="connsiteX0" fmla="*/ 0 w 1586429"/>
+                    <a:gd name="connsiteY0" fmla="*/ 1050257 h 1050257"/>
+                    <a:gd name="connsiteX1" fmla="*/ 672029 w 1586429"/>
+                    <a:gd name="connsiteY1" fmla="*/ 3654 h 1050257"/>
+                    <a:gd name="connsiteX2" fmla="*/ 870332 w 1586429"/>
+                    <a:gd name="connsiteY2" fmla="*/ 686700 h 1050257"/>
+                    <a:gd name="connsiteX3" fmla="*/ 1586429 w 1586429"/>
+                    <a:gd name="connsiteY3" fmla="*/ 190941 h 1050257"/>
+                    <a:gd name="connsiteX0" fmla="*/ 0 w 1586429"/>
+                    <a:gd name="connsiteY0" fmla="*/ 1048538 h 1048538"/>
+                    <a:gd name="connsiteX1" fmla="*/ 672029 w 1586429"/>
+                    <a:gd name="connsiteY1" fmla="*/ 1935 h 1048538"/>
+                    <a:gd name="connsiteX2" fmla="*/ 1134737 w 1586429"/>
+                    <a:gd name="connsiteY2" fmla="*/ 773116 h 1048538"/>
+                    <a:gd name="connsiteX3" fmla="*/ 1586429 w 1586429"/>
+                    <a:gd name="connsiteY3" fmla="*/ 189222 h 1048538"/>
+                    <a:gd name="connsiteX0" fmla="*/ 0 w 1586429"/>
+                    <a:gd name="connsiteY0" fmla="*/ 859316 h 859316"/>
+                    <a:gd name="connsiteX1" fmla="*/ 583894 w 1586429"/>
+                    <a:gd name="connsiteY1" fmla="*/ 11017 h 859316"/>
+                    <a:gd name="connsiteX2" fmla="*/ 1134737 w 1586429"/>
+                    <a:gd name="connsiteY2" fmla="*/ 583894 h 859316"/>
+                    <a:gd name="connsiteX3" fmla="*/ 1586429 w 1586429"/>
+                    <a:gd name="connsiteY3" fmla="*/ 0 h 859316"/>
+                    <a:gd name="connsiteX0" fmla="*/ 0 w 1586429"/>
+                    <a:gd name="connsiteY0" fmla="*/ 859316 h 859316"/>
+                    <a:gd name="connsiteX1" fmla="*/ 572877 w 1586429"/>
+                    <a:gd name="connsiteY1" fmla="*/ 121186 h 859316"/>
+                    <a:gd name="connsiteX2" fmla="*/ 1134737 w 1586429"/>
+                    <a:gd name="connsiteY2" fmla="*/ 583894 h 859316"/>
+                    <a:gd name="connsiteX3" fmla="*/ 1586429 w 1586429"/>
+                    <a:gd name="connsiteY3" fmla="*/ 0 h 859316"/>
+                    <a:gd name="connsiteX0" fmla="*/ 0 w 1586429"/>
+                    <a:gd name="connsiteY0" fmla="*/ 859316 h 859316"/>
+                    <a:gd name="connsiteX1" fmla="*/ 572877 w 1586429"/>
+                    <a:gd name="connsiteY1" fmla="*/ 121186 h 859316"/>
+                    <a:gd name="connsiteX2" fmla="*/ 1134737 w 1586429"/>
+                    <a:gd name="connsiteY2" fmla="*/ 583894 h 859316"/>
+                    <a:gd name="connsiteX3" fmla="*/ 1454226 w 1586429"/>
+                    <a:gd name="connsiteY3" fmla="*/ 319488 h 859316"/>
+                    <a:gd name="connsiteX4" fmla="*/ 1586429 w 1586429"/>
+                    <a:gd name="connsiteY4" fmla="*/ 0 h 859316"/>
+                    <a:gd name="connsiteX0" fmla="*/ 0 w 1483235"/>
+                    <a:gd name="connsiteY0" fmla="*/ 826266 h 826266"/>
+                    <a:gd name="connsiteX1" fmla="*/ 572877 w 1483235"/>
+                    <a:gd name="connsiteY1" fmla="*/ 88136 h 826266"/>
+                    <a:gd name="connsiteX2" fmla="*/ 1134737 w 1483235"/>
+                    <a:gd name="connsiteY2" fmla="*/ 550844 h 826266"/>
+                    <a:gd name="connsiteX3" fmla="*/ 1454226 w 1483235"/>
+                    <a:gd name="connsiteY3" fmla="*/ 286438 h 826266"/>
+                    <a:gd name="connsiteX4" fmla="*/ 1465243 w 1483235"/>
+                    <a:gd name="connsiteY4" fmla="*/ 0 h 826266"/>
+                    <a:gd name="connsiteX0" fmla="*/ 0 w 1509311"/>
+                    <a:gd name="connsiteY0" fmla="*/ 826266 h 826266"/>
+                    <a:gd name="connsiteX1" fmla="*/ 572877 w 1509311"/>
+                    <a:gd name="connsiteY1" fmla="*/ 88136 h 826266"/>
+                    <a:gd name="connsiteX2" fmla="*/ 1134737 w 1509311"/>
+                    <a:gd name="connsiteY2" fmla="*/ 550844 h 826266"/>
+                    <a:gd name="connsiteX3" fmla="*/ 1454226 w 1509311"/>
+                    <a:gd name="connsiteY3" fmla="*/ 286438 h 826266"/>
+                    <a:gd name="connsiteX4" fmla="*/ 1509311 w 1509311"/>
+                    <a:gd name="connsiteY4" fmla="*/ 0 h 826266"/>
+                    <a:gd name="connsiteX0" fmla="*/ 0 w 1509311"/>
+                    <a:gd name="connsiteY0" fmla="*/ 826266 h 826266"/>
+                    <a:gd name="connsiteX1" fmla="*/ 572877 w 1509311"/>
+                    <a:gd name="connsiteY1" fmla="*/ 88136 h 826266"/>
+                    <a:gd name="connsiteX2" fmla="*/ 1134737 w 1509311"/>
+                    <a:gd name="connsiteY2" fmla="*/ 550844 h 826266"/>
+                    <a:gd name="connsiteX3" fmla="*/ 1399142 w 1509311"/>
+                    <a:gd name="connsiteY3" fmla="*/ 275421 h 826266"/>
+                    <a:gd name="connsiteX4" fmla="*/ 1509311 w 1509311"/>
+                    <a:gd name="connsiteY4" fmla="*/ 0 h 826266"/>
+                    <a:gd name="connsiteX0" fmla="*/ 0 w 1443209"/>
+                    <a:gd name="connsiteY0" fmla="*/ 826266 h 826266"/>
+                    <a:gd name="connsiteX1" fmla="*/ 572877 w 1443209"/>
+                    <a:gd name="connsiteY1" fmla="*/ 88136 h 826266"/>
+                    <a:gd name="connsiteX2" fmla="*/ 1134737 w 1443209"/>
+                    <a:gd name="connsiteY2" fmla="*/ 550844 h 826266"/>
+                    <a:gd name="connsiteX3" fmla="*/ 1399142 w 1443209"/>
+                    <a:gd name="connsiteY3" fmla="*/ 275421 h 826266"/>
+                    <a:gd name="connsiteX4" fmla="*/ 1443209 w 1443209"/>
+                    <a:gd name="connsiteY4" fmla="*/ 0 h 826266"/>
+                    <a:gd name="connsiteX0" fmla="*/ 0 w 1443209"/>
+                    <a:gd name="connsiteY0" fmla="*/ 826266 h 826266"/>
+                    <a:gd name="connsiteX1" fmla="*/ 572877 w 1443209"/>
+                    <a:gd name="connsiteY1" fmla="*/ 88136 h 826266"/>
+                    <a:gd name="connsiteX2" fmla="*/ 1134737 w 1443209"/>
+                    <a:gd name="connsiteY2" fmla="*/ 550844 h 826266"/>
+                    <a:gd name="connsiteX3" fmla="*/ 1388125 w 1443209"/>
+                    <a:gd name="connsiteY3" fmla="*/ 275421 h 826266"/>
+                    <a:gd name="connsiteX4" fmla="*/ 1443209 w 1443209"/>
+                    <a:gd name="connsiteY4" fmla="*/ 0 h 826266"/>
+                    <a:gd name="connsiteX0" fmla="*/ 0 w 1443209"/>
+                    <a:gd name="connsiteY0" fmla="*/ 826266 h 826266"/>
+                    <a:gd name="connsiteX1" fmla="*/ 572877 w 1443209"/>
+                    <a:gd name="connsiteY1" fmla="*/ 88136 h 826266"/>
+                    <a:gd name="connsiteX2" fmla="*/ 1134737 w 1443209"/>
+                    <a:gd name="connsiteY2" fmla="*/ 550844 h 826266"/>
+                    <a:gd name="connsiteX3" fmla="*/ 1388125 w 1443209"/>
+                    <a:gd name="connsiteY3" fmla="*/ 275421 h 826266"/>
+                    <a:gd name="connsiteX4" fmla="*/ 1443209 w 1443209"/>
+                    <a:gd name="connsiteY4" fmla="*/ 0 h 826266"/>
+                    <a:gd name="connsiteX0" fmla="*/ 0 w 1443209"/>
+                    <a:gd name="connsiteY0" fmla="*/ 826266 h 826266"/>
+                    <a:gd name="connsiteX1" fmla="*/ 572877 w 1443209"/>
+                    <a:gd name="connsiteY1" fmla="*/ 88136 h 826266"/>
+                    <a:gd name="connsiteX2" fmla="*/ 1134737 w 1443209"/>
+                    <a:gd name="connsiteY2" fmla="*/ 550844 h 826266"/>
+                    <a:gd name="connsiteX3" fmla="*/ 1388125 w 1443209"/>
+                    <a:gd name="connsiteY3" fmla="*/ 275421 h 826266"/>
+                    <a:gd name="connsiteX4" fmla="*/ 1443209 w 1443209"/>
+                    <a:gd name="connsiteY4" fmla="*/ 0 h 826266"/>
+                    <a:gd name="connsiteX0" fmla="*/ 0 w 1465243"/>
+                    <a:gd name="connsiteY0" fmla="*/ 914401 h 914401"/>
+                    <a:gd name="connsiteX1" fmla="*/ 572877 w 1465243"/>
+                    <a:gd name="connsiteY1" fmla="*/ 176271 h 914401"/>
+                    <a:gd name="connsiteX2" fmla="*/ 1134737 w 1465243"/>
+                    <a:gd name="connsiteY2" fmla="*/ 638979 h 914401"/>
+                    <a:gd name="connsiteX3" fmla="*/ 1388125 w 1465243"/>
+                    <a:gd name="connsiteY3" fmla="*/ 363556 h 914401"/>
+                    <a:gd name="connsiteX4" fmla="*/ 1465243 w 1465243"/>
+                    <a:gd name="connsiteY4" fmla="*/ 0 h 914401"/>
                   </a:gdLst>
                   <a:ahLst/>
                   <a:cxnLst>
@@ -4475,27 +4974,35 @@
                     <a:cxn ang="0">
                       <a:pos x="connsiteX3" y="connsiteY3"/>
                     </a:cxn>
+                    <a:cxn ang="0">
+                      <a:pos x="connsiteX4" y="connsiteY4"/>
+                    </a:cxn>
                   </a:cxnLst>
                   <a:rect l="l" t="t" r="r" b="b"/>
                   <a:pathLst>
-                    <a:path w="629760" h="1225296">
+                    <a:path w="1465243" h="914401">
                       <a:moveTo>
-                        <a:pt x="242148" y="0"/>
+                        <a:pt x="0" y="914401"/>
                       </a:moveTo>
                       <a:cubicBezTo>
-                        <a:pt x="450936" y="432054"/>
-                        <a:pt x="659724" y="864108"/>
-                        <a:pt x="626196" y="996696"/>
+                        <a:pt x="263487" y="421396"/>
+                        <a:pt x="383754" y="222175"/>
+                        <a:pt x="572877" y="176271"/>
                       </a:cubicBezTo>
                       <a:cubicBezTo>
-                        <a:pt x="592668" y="1129284"/>
-                        <a:pt x="129372" y="757428"/>
-                        <a:pt x="40980" y="795528"/>
+                        <a:pt x="762000" y="130367"/>
+                        <a:pt x="998862" y="607765"/>
+                        <a:pt x="1134737" y="638979"/>
                       </a:cubicBezTo>
                       <a:cubicBezTo>
-                        <a:pt x="-47412" y="833628"/>
-                        <a:pt x="24216" y="1029462"/>
-                        <a:pt x="95844" y="1225296"/>
+                        <a:pt x="1270612" y="670193"/>
+                        <a:pt x="1356910" y="482906"/>
+                        <a:pt x="1388125" y="363556"/>
+                      </a:cubicBezTo>
+                      <a:cubicBezTo>
+                        <a:pt x="1430357" y="233190"/>
+                        <a:pt x="1430356" y="36723"/>
+                        <a:pt x="1465243" y="0"/>
                       </a:cubicBezTo>
                     </a:path>
                   </a:pathLst>
@@ -4503,7 +5010,7 @@
                 <a:noFill/>
                 <a:ln w="57150">
                   <a:solidFill>
-                    <a:srgbClr val="FF0000"/>
+                    <a:srgbClr val="13DF03"/>
                   </a:solidFill>
                   <a:headEnd type="oval"/>
                 </a:ln>
@@ -4529,20 +5036,24 @@
                 <a:lstStyle/>
                 <a:p>
                   <a:pPr algn="ctr"/>
-                  <a:endParaRPr lang="en-CA"/>
+                  <a:endParaRPr lang="en-CA">
+                    <a:solidFill>
+                      <a:srgbClr val="13DF03"/>
+                    </a:solidFill>
+                  </a:endParaRPr>
                 </a:p>
               </p:txBody>
             </p:sp>
             <p:sp>
               <p:nvSpPr>
-                <p:cNvPr id="6" name="TextBox 5"/>
+                <p:cNvPr id="12" name="TextBox 11"/>
                 <p:cNvSpPr txBox="1"/>
                 <p:nvPr/>
               </p:nvSpPr>
               <p:spPr>
                 <a:xfrm>
-                  <a:off x="3525398" y="4968607"/>
-                  <a:ext cx="3051671" cy="1200329"/>
+                  <a:off x="6720288" y="358049"/>
+                  <a:ext cx="3525398" cy="1200329"/>
                 </a:xfrm>
                 <a:prstGeom prst="rect">
                   <a:avLst/>
@@ -4558,393 +5069,42 @@
                   <a:r>
                     <a:rPr lang="en-CA" sz="3600" dirty="0" smtClean="0">
                       <a:solidFill>
-                        <a:srgbClr val="FF0000"/>
+                        <a:srgbClr val="13DF03"/>
                       </a:solidFill>
                     </a:rPr>
-                    <a:t>Transverse process</a:t>
+                    <a:t>Superior articular process</a:t>
                   </a:r>
                   <a:endParaRPr lang="en-CA" sz="3600" dirty="0">
                     <a:solidFill>
-                      <a:srgbClr val="FF0000"/>
+                      <a:srgbClr val="13DF03"/>
                     </a:solidFill>
                   </a:endParaRPr>
-                </a:p>
-              </p:txBody>
-            </p:sp>
-            <p:sp>
-              <p:nvSpPr>
-                <p:cNvPr id="8" name="TextBox 7"/>
-                <p:cNvSpPr txBox="1"/>
-                <p:nvPr/>
-              </p:nvSpPr>
-              <p:spPr>
-                <a:xfrm>
-                  <a:off x="2401477" y="-406310"/>
-                  <a:ext cx="2115239" cy="1754326"/>
-                </a:xfrm>
-                <a:prstGeom prst="rect">
-                  <a:avLst/>
-                </a:prstGeom>
-                <a:noFill/>
-              </p:spPr>
-              <p:txBody>
-                <a:bodyPr wrap="square" rtlCol="0">
-                  <a:spAutoFit/>
-                </a:bodyPr>
-                <a:lstStyle/>
-                <a:p>
-                  <a:r>
-                    <a:rPr lang="en-CA" sz="3600" dirty="0" smtClean="0">
-                      <a:solidFill>
-                        <a:srgbClr val="00B0F0"/>
-                      </a:solidFill>
-                    </a:rPr>
-                    <a:t>Superior vertebral endplate</a:t>
-                  </a:r>
-                  <a:endParaRPr lang="en-CA" sz="3600" dirty="0">
-                    <a:solidFill>
-                      <a:srgbClr val="00B0F0"/>
-                    </a:solidFill>
-                  </a:endParaRPr>
-                </a:p>
-              </p:txBody>
-            </p:sp>
-            <p:sp>
-              <p:nvSpPr>
-                <p:cNvPr id="9" name="Freeform 8"/>
-                <p:cNvSpPr/>
-                <p:nvPr/>
-              </p:nvSpPr>
-              <p:spPr>
-                <a:xfrm>
-                  <a:off x="3205908" y="1293195"/>
-                  <a:ext cx="1641513" cy="689845"/>
-                </a:xfrm>
-                <a:custGeom>
-                  <a:avLst/>
-                  <a:gdLst>
-                    <a:gd name="connsiteX0" fmla="*/ 1663547 w 1663547"/>
-                    <a:gd name="connsiteY0" fmla="*/ 198303 h 606268"/>
-                    <a:gd name="connsiteX1" fmla="*/ 936434 w 1663547"/>
-                    <a:gd name="connsiteY1" fmla="*/ 88135 h 606268"/>
-                    <a:gd name="connsiteX2" fmla="*/ 903383 w 1663547"/>
-                    <a:gd name="connsiteY2" fmla="*/ 605928 h 606268"/>
-                    <a:gd name="connsiteX3" fmla="*/ 0 w 1663547"/>
-                    <a:gd name="connsiteY3" fmla="*/ 0 h 606268"/>
-                    <a:gd name="connsiteX0" fmla="*/ 1784732 w 1784732"/>
-                    <a:gd name="connsiteY0" fmla="*/ 99151 h 606281"/>
-                    <a:gd name="connsiteX1" fmla="*/ 936434 w 1784732"/>
-                    <a:gd name="connsiteY1" fmla="*/ 88135 h 606281"/>
-                    <a:gd name="connsiteX2" fmla="*/ 903383 w 1784732"/>
-                    <a:gd name="connsiteY2" fmla="*/ 605928 h 606281"/>
-                    <a:gd name="connsiteX3" fmla="*/ 0 w 1784732"/>
-                    <a:gd name="connsiteY3" fmla="*/ 0 h 606281"/>
-                    <a:gd name="connsiteX0" fmla="*/ 1784732 w 1784732"/>
-                    <a:gd name="connsiteY0" fmla="*/ 99151 h 606281"/>
-                    <a:gd name="connsiteX1" fmla="*/ 936434 w 1784732"/>
-                    <a:gd name="connsiteY1" fmla="*/ 88135 h 606281"/>
-                    <a:gd name="connsiteX2" fmla="*/ 903383 w 1784732"/>
-                    <a:gd name="connsiteY2" fmla="*/ 605928 h 606281"/>
-                    <a:gd name="connsiteX3" fmla="*/ 0 w 1784732"/>
-                    <a:gd name="connsiteY3" fmla="*/ 0 h 606281"/>
-                    <a:gd name="connsiteX0" fmla="*/ 1784732 w 1784732"/>
-                    <a:gd name="connsiteY0" fmla="*/ 99151 h 606281"/>
-                    <a:gd name="connsiteX1" fmla="*/ 936434 w 1784732"/>
-                    <a:gd name="connsiteY1" fmla="*/ 88135 h 606281"/>
-                    <a:gd name="connsiteX2" fmla="*/ 903383 w 1784732"/>
-                    <a:gd name="connsiteY2" fmla="*/ 605928 h 606281"/>
-                    <a:gd name="connsiteX3" fmla="*/ 0 w 1784732"/>
-                    <a:gd name="connsiteY3" fmla="*/ 0 h 606281"/>
-                    <a:gd name="connsiteX0" fmla="*/ 1784732 w 1784732"/>
-                    <a:gd name="connsiteY0" fmla="*/ 99151 h 606281"/>
-                    <a:gd name="connsiteX1" fmla="*/ 936434 w 1784732"/>
-                    <a:gd name="connsiteY1" fmla="*/ 88135 h 606281"/>
-                    <a:gd name="connsiteX2" fmla="*/ 903383 w 1784732"/>
-                    <a:gd name="connsiteY2" fmla="*/ 605928 h 606281"/>
-                    <a:gd name="connsiteX3" fmla="*/ 0 w 1784732"/>
-                    <a:gd name="connsiteY3" fmla="*/ 0 h 606281"/>
-                    <a:gd name="connsiteX0" fmla="*/ 1729648 w 1729648"/>
-                    <a:gd name="connsiteY0" fmla="*/ 121185 h 628506"/>
-                    <a:gd name="connsiteX1" fmla="*/ 881350 w 1729648"/>
-                    <a:gd name="connsiteY1" fmla="*/ 110169 h 628506"/>
-                    <a:gd name="connsiteX2" fmla="*/ 848299 w 1729648"/>
-                    <a:gd name="connsiteY2" fmla="*/ 627962 h 628506"/>
-                    <a:gd name="connsiteX3" fmla="*/ 0 w 1729648"/>
-                    <a:gd name="connsiteY3" fmla="*/ 0 h 628506"/>
-                    <a:gd name="connsiteX0" fmla="*/ 1729648 w 1729648"/>
-                    <a:gd name="connsiteY0" fmla="*/ 121185 h 628506"/>
-                    <a:gd name="connsiteX1" fmla="*/ 881350 w 1729648"/>
-                    <a:gd name="connsiteY1" fmla="*/ 110169 h 628506"/>
-                    <a:gd name="connsiteX2" fmla="*/ 848299 w 1729648"/>
-                    <a:gd name="connsiteY2" fmla="*/ 627962 h 628506"/>
-                    <a:gd name="connsiteX3" fmla="*/ 0 w 1729648"/>
-                    <a:gd name="connsiteY3" fmla="*/ 0 h 628506"/>
-                    <a:gd name="connsiteX0" fmla="*/ 1729648 w 1729648"/>
-                    <a:gd name="connsiteY0" fmla="*/ 121185 h 628506"/>
-                    <a:gd name="connsiteX1" fmla="*/ 881350 w 1729648"/>
-                    <a:gd name="connsiteY1" fmla="*/ 110169 h 628506"/>
-                    <a:gd name="connsiteX2" fmla="*/ 848299 w 1729648"/>
-                    <a:gd name="connsiteY2" fmla="*/ 627962 h 628506"/>
-                    <a:gd name="connsiteX3" fmla="*/ 0 w 1729648"/>
-                    <a:gd name="connsiteY3" fmla="*/ 0 h 628506"/>
-                    <a:gd name="connsiteX0" fmla="*/ 1729648 w 1729648"/>
-                    <a:gd name="connsiteY0" fmla="*/ 121185 h 661525"/>
-                    <a:gd name="connsiteX1" fmla="*/ 881350 w 1729648"/>
-                    <a:gd name="connsiteY1" fmla="*/ 110169 h 661525"/>
-                    <a:gd name="connsiteX2" fmla="*/ 561861 w 1729648"/>
-                    <a:gd name="connsiteY2" fmla="*/ 661012 h 661525"/>
-                    <a:gd name="connsiteX3" fmla="*/ 0 w 1729648"/>
-                    <a:gd name="connsiteY3" fmla="*/ 0 h 661525"/>
-                    <a:gd name="connsiteX0" fmla="*/ 1729648 w 1729648"/>
-                    <a:gd name="connsiteY0" fmla="*/ 121185 h 664232"/>
-                    <a:gd name="connsiteX1" fmla="*/ 881350 w 1729648"/>
-                    <a:gd name="connsiteY1" fmla="*/ 110169 h 664232"/>
-                    <a:gd name="connsiteX2" fmla="*/ 561861 w 1729648"/>
-                    <a:gd name="connsiteY2" fmla="*/ 661012 h 664232"/>
-                    <a:gd name="connsiteX3" fmla="*/ 0 w 1729648"/>
-                    <a:gd name="connsiteY3" fmla="*/ 0 h 664232"/>
-                    <a:gd name="connsiteX0" fmla="*/ 1729648 w 1729648"/>
-                    <a:gd name="connsiteY0" fmla="*/ 121185 h 662467"/>
-                    <a:gd name="connsiteX1" fmla="*/ 936434 w 1729648"/>
-                    <a:gd name="connsiteY1" fmla="*/ 176270 h 662467"/>
-                    <a:gd name="connsiteX2" fmla="*/ 561861 w 1729648"/>
-                    <a:gd name="connsiteY2" fmla="*/ 661012 h 662467"/>
-                    <a:gd name="connsiteX3" fmla="*/ 0 w 1729648"/>
-                    <a:gd name="connsiteY3" fmla="*/ 0 h 662467"/>
-                    <a:gd name="connsiteX0" fmla="*/ 1729648 w 1729648"/>
-                    <a:gd name="connsiteY0" fmla="*/ 134443 h 674274"/>
-                    <a:gd name="connsiteX1" fmla="*/ 958468 w 1729648"/>
-                    <a:gd name="connsiteY1" fmla="*/ 24275 h 674274"/>
-                    <a:gd name="connsiteX2" fmla="*/ 561861 w 1729648"/>
-                    <a:gd name="connsiteY2" fmla="*/ 674270 h 674274"/>
-                    <a:gd name="connsiteX3" fmla="*/ 0 w 1729648"/>
-                    <a:gd name="connsiteY3" fmla="*/ 13258 h 674274"/>
-                    <a:gd name="connsiteX0" fmla="*/ 1641513 w 1641513"/>
-                    <a:gd name="connsiteY0" fmla="*/ 182173 h 666920"/>
-                    <a:gd name="connsiteX1" fmla="*/ 958468 w 1641513"/>
-                    <a:gd name="connsiteY1" fmla="*/ 16921 h 666920"/>
-                    <a:gd name="connsiteX2" fmla="*/ 561861 w 1641513"/>
-                    <a:gd name="connsiteY2" fmla="*/ 666916 h 666920"/>
-                    <a:gd name="connsiteX3" fmla="*/ 0 w 1641513"/>
-                    <a:gd name="connsiteY3" fmla="*/ 5904 h 666920"/>
-                    <a:gd name="connsiteX0" fmla="*/ 1641513 w 1641513"/>
-                    <a:gd name="connsiteY0" fmla="*/ 205098 h 689845"/>
-                    <a:gd name="connsiteX1" fmla="*/ 958468 w 1641513"/>
-                    <a:gd name="connsiteY1" fmla="*/ 39846 h 689845"/>
-                    <a:gd name="connsiteX2" fmla="*/ 561861 w 1641513"/>
-                    <a:gd name="connsiteY2" fmla="*/ 689841 h 689845"/>
-                    <a:gd name="connsiteX3" fmla="*/ 0 w 1641513"/>
-                    <a:gd name="connsiteY3" fmla="*/ 28829 h 689845"/>
-                  </a:gdLst>
-                  <a:ahLst/>
-                  <a:cxnLst>
-                    <a:cxn ang="0">
-                      <a:pos x="connsiteX0" y="connsiteY0"/>
-                    </a:cxn>
-                    <a:cxn ang="0">
-                      <a:pos x="connsiteX1" y="connsiteY1"/>
-                    </a:cxn>
-                    <a:cxn ang="0">
-                      <a:pos x="connsiteX2" y="connsiteY2"/>
-                    </a:cxn>
-                    <a:cxn ang="0">
-                      <a:pos x="connsiteX3" y="connsiteY3"/>
-                    </a:cxn>
-                  </a:cxnLst>
-                  <a:rect l="l" t="t" r="r" b="b"/>
-                  <a:pathLst>
-                    <a:path w="1641513" h="689845">
-                      <a:moveTo>
-                        <a:pt x="1641513" y="205098"/>
-                      </a:moveTo>
-                      <a:cubicBezTo>
-                        <a:pt x="1319270" y="-5140"/>
-                        <a:pt x="1138410" y="-40945"/>
-                        <a:pt x="958468" y="39846"/>
-                      </a:cubicBezTo>
-                      <a:cubicBezTo>
-                        <a:pt x="778526" y="120637"/>
-                        <a:pt x="721606" y="691677"/>
-                        <a:pt x="561861" y="689841"/>
-                      </a:cubicBezTo>
-                      <a:cubicBezTo>
-                        <a:pt x="402116" y="688005"/>
-                        <a:pt x="43149" y="445633"/>
-                        <a:pt x="0" y="28829"/>
-                      </a:cubicBezTo>
-                    </a:path>
-                  </a:pathLst>
-                </a:custGeom>
-                <a:noFill/>
-                <a:ln w="57150">
-                  <a:solidFill>
-                    <a:srgbClr val="00B0F0"/>
-                  </a:solidFill>
-                  <a:headEnd type="oval"/>
-                </a:ln>
-              </p:spPr>
-              <p:style>
-                <a:lnRef idx="2">
-                  <a:schemeClr val="accent1">
-                    <a:shade val="50000"/>
-                  </a:schemeClr>
-                </a:lnRef>
-                <a:fillRef idx="1">
-                  <a:schemeClr val="accent1"/>
-                </a:fillRef>
-                <a:effectRef idx="0">
-                  <a:schemeClr val="accent1"/>
-                </a:effectRef>
-                <a:fontRef idx="minor">
-                  <a:schemeClr val="lt1"/>
-                </a:fontRef>
-              </p:style>
-              <p:txBody>
-                <a:bodyPr rtlCol="0" anchor="ctr"/>
-                <a:lstStyle/>
-                <a:p>
-                  <a:pPr algn="ctr"/>
-                  <a:endParaRPr lang="en-CA"/>
                 </a:p>
               </p:txBody>
             </p:sp>
           </p:grpSp>
           <p:sp>
             <p:nvSpPr>
-              <p:cNvPr id="11" name="Freeform 10"/>
+              <p:cNvPr id="14" name="Freeform 13"/>
               <p:cNvSpPr/>
               <p:nvPr/>
             </p:nvSpPr>
             <p:spPr>
               <a:xfrm>
-                <a:off x="6830458" y="1344057"/>
-                <a:ext cx="1465243" cy="914401"/>
+                <a:off x="7568588" y="4879056"/>
+                <a:ext cx="1145754" cy="685275"/>
               </a:xfrm>
               <a:custGeom>
                 <a:avLst/>
                 <a:gdLst>
-                  <a:gd name="connsiteX0" fmla="*/ 0 w 1586429"/>
-                  <a:gd name="connsiteY0" fmla="*/ 1050257 h 1050257"/>
-                  <a:gd name="connsiteX1" fmla="*/ 672029 w 1586429"/>
-                  <a:gd name="connsiteY1" fmla="*/ 3654 h 1050257"/>
-                  <a:gd name="connsiteX2" fmla="*/ 870332 w 1586429"/>
-                  <a:gd name="connsiteY2" fmla="*/ 686700 h 1050257"/>
-                  <a:gd name="connsiteX3" fmla="*/ 1586429 w 1586429"/>
-                  <a:gd name="connsiteY3" fmla="*/ 190941 h 1050257"/>
-                  <a:gd name="connsiteX0" fmla="*/ 0 w 1586429"/>
-                  <a:gd name="connsiteY0" fmla="*/ 1048538 h 1048538"/>
-                  <a:gd name="connsiteX1" fmla="*/ 672029 w 1586429"/>
-                  <a:gd name="connsiteY1" fmla="*/ 1935 h 1048538"/>
-                  <a:gd name="connsiteX2" fmla="*/ 1134737 w 1586429"/>
-                  <a:gd name="connsiteY2" fmla="*/ 773116 h 1048538"/>
-                  <a:gd name="connsiteX3" fmla="*/ 1586429 w 1586429"/>
-                  <a:gd name="connsiteY3" fmla="*/ 189222 h 1048538"/>
-                  <a:gd name="connsiteX0" fmla="*/ 0 w 1586429"/>
-                  <a:gd name="connsiteY0" fmla="*/ 859316 h 859316"/>
-                  <a:gd name="connsiteX1" fmla="*/ 583894 w 1586429"/>
-                  <a:gd name="connsiteY1" fmla="*/ 11017 h 859316"/>
-                  <a:gd name="connsiteX2" fmla="*/ 1134737 w 1586429"/>
-                  <a:gd name="connsiteY2" fmla="*/ 583894 h 859316"/>
-                  <a:gd name="connsiteX3" fmla="*/ 1586429 w 1586429"/>
-                  <a:gd name="connsiteY3" fmla="*/ 0 h 859316"/>
-                  <a:gd name="connsiteX0" fmla="*/ 0 w 1586429"/>
-                  <a:gd name="connsiteY0" fmla="*/ 859316 h 859316"/>
-                  <a:gd name="connsiteX1" fmla="*/ 572877 w 1586429"/>
-                  <a:gd name="connsiteY1" fmla="*/ 121186 h 859316"/>
-                  <a:gd name="connsiteX2" fmla="*/ 1134737 w 1586429"/>
-                  <a:gd name="connsiteY2" fmla="*/ 583894 h 859316"/>
-                  <a:gd name="connsiteX3" fmla="*/ 1586429 w 1586429"/>
-                  <a:gd name="connsiteY3" fmla="*/ 0 h 859316"/>
-                  <a:gd name="connsiteX0" fmla="*/ 0 w 1586429"/>
-                  <a:gd name="connsiteY0" fmla="*/ 859316 h 859316"/>
-                  <a:gd name="connsiteX1" fmla="*/ 572877 w 1586429"/>
-                  <a:gd name="connsiteY1" fmla="*/ 121186 h 859316"/>
-                  <a:gd name="connsiteX2" fmla="*/ 1134737 w 1586429"/>
-                  <a:gd name="connsiteY2" fmla="*/ 583894 h 859316"/>
-                  <a:gd name="connsiteX3" fmla="*/ 1454226 w 1586429"/>
-                  <a:gd name="connsiteY3" fmla="*/ 319488 h 859316"/>
-                  <a:gd name="connsiteX4" fmla="*/ 1586429 w 1586429"/>
-                  <a:gd name="connsiteY4" fmla="*/ 0 h 859316"/>
-                  <a:gd name="connsiteX0" fmla="*/ 0 w 1483235"/>
-                  <a:gd name="connsiteY0" fmla="*/ 826266 h 826266"/>
-                  <a:gd name="connsiteX1" fmla="*/ 572877 w 1483235"/>
-                  <a:gd name="connsiteY1" fmla="*/ 88136 h 826266"/>
-                  <a:gd name="connsiteX2" fmla="*/ 1134737 w 1483235"/>
-                  <a:gd name="connsiteY2" fmla="*/ 550844 h 826266"/>
-                  <a:gd name="connsiteX3" fmla="*/ 1454226 w 1483235"/>
-                  <a:gd name="connsiteY3" fmla="*/ 286438 h 826266"/>
-                  <a:gd name="connsiteX4" fmla="*/ 1465243 w 1483235"/>
-                  <a:gd name="connsiteY4" fmla="*/ 0 h 826266"/>
-                  <a:gd name="connsiteX0" fmla="*/ 0 w 1509311"/>
-                  <a:gd name="connsiteY0" fmla="*/ 826266 h 826266"/>
-                  <a:gd name="connsiteX1" fmla="*/ 572877 w 1509311"/>
-                  <a:gd name="connsiteY1" fmla="*/ 88136 h 826266"/>
-                  <a:gd name="connsiteX2" fmla="*/ 1134737 w 1509311"/>
-                  <a:gd name="connsiteY2" fmla="*/ 550844 h 826266"/>
-                  <a:gd name="connsiteX3" fmla="*/ 1454226 w 1509311"/>
-                  <a:gd name="connsiteY3" fmla="*/ 286438 h 826266"/>
-                  <a:gd name="connsiteX4" fmla="*/ 1509311 w 1509311"/>
-                  <a:gd name="connsiteY4" fmla="*/ 0 h 826266"/>
-                  <a:gd name="connsiteX0" fmla="*/ 0 w 1509311"/>
-                  <a:gd name="connsiteY0" fmla="*/ 826266 h 826266"/>
-                  <a:gd name="connsiteX1" fmla="*/ 572877 w 1509311"/>
-                  <a:gd name="connsiteY1" fmla="*/ 88136 h 826266"/>
-                  <a:gd name="connsiteX2" fmla="*/ 1134737 w 1509311"/>
-                  <a:gd name="connsiteY2" fmla="*/ 550844 h 826266"/>
-                  <a:gd name="connsiteX3" fmla="*/ 1399142 w 1509311"/>
-                  <a:gd name="connsiteY3" fmla="*/ 275421 h 826266"/>
-                  <a:gd name="connsiteX4" fmla="*/ 1509311 w 1509311"/>
-                  <a:gd name="connsiteY4" fmla="*/ 0 h 826266"/>
-                  <a:gd name="connsiteX0" fmla="*/ 0 w 1443209"/>
-                  <a:gd name="connsiteY0" fmla="*/ 826266 h 826266"/>
-                  <a:gd name="connsiteX1" fmla="*/ 572877 w 1443209"/>
-                  <a:gd name="connsiteY1" fmla="*/ 88136 h 826266"/>
-                  <a:gd name="connsiteX2" fmla="*/ 1134737 w 1443209"/>
-                  <a:gd name="connsiteY2" fmla="*/ 550844 h 826266"/>
-                  <a:gd name="connsiteX3" fmla="*/ 1399142 w 1443209"/>
-                  <a:gd name="connsiteY3" fmla="*/ 275421 h 826266"/>
-                  <a:gd name="connsiteX4" fmla="*/ 1443209 w 1443209"/>
-                  <a:gd name="connsiteY4" fmla="*/ 0 h 826266"/>
-                  <a:gd name="connsiteX0" fmla="*/ 0 w 1443209"/>
-                  <a:gd name="connsiteY0" fmla="*/ 826266 h 826266"/>
-                  <a:gd name="connsiteX1" fmla="*/ 572877 w 1443209"/>
-                  <a:gd name="connsiteY1" fmla="*/ 88136 h 826266"/>
-                  <a:gd name="connsiteX2" fmla="*/ 1134737 w 1443209"/>
-                  <a:gd name="connsiteY2" fmla="*/ 550844 h 826266"/>
-                  <a:gd name="connsiteX3" fmla="*/ 1388125 w 1443209"/>
-                  <a:gd name="connsiteY3" fmla="*/ 275421 h 826266"/>
-                  <a:gd name="connsiteX4" fmla="*/ 1443209 w 1443209"/>
-                  <a:gd name="connsiteY4" fmla="*/ 0 h 826266"/>
-                  <a:gd name="connsiteX0" fmla="*/ 0 w 1443209"/>
-                  <a:gd name="connsiteY0" fmla="*/ 826266 h 826266"/>
-                  <a:gd name="connsiteX1" fmla="*/ 572877 w 1443209"/>
-                  <a:gd name="connsiteY1" fmla="*/ 88136 h 826266"/>
-                  <a:gd name="connsiteX2" fmla="*/ 1134737 w 1443209"/>
-                  <a:gd name="connsiteY2" fmla="*/ 550844 h 826266"/>
-                  <a:gd name="connsiteX3" fmla="*/ 1388125 w 1443209"/>
-                  <a:gd name="connsiteY3" fmla="*/ 275421 h 826266"/>
-                  <a:gd name="connsiteX4" fmla="*/ 1443209 w 1443209"/>
-                  <a:gd name="connsiteY4" fmla="*/ 0 h 826266"/>
-                  <a:gd name="connsiteX0" fmla="*/ 0 w 1443209"/>
-                  <a:gd name="connsiteY0" fmla="*/ 826266 h 826266"/>
-                  <a:gd name="connsiteX1" fmla="*/ 572877 w 1443209"/>
-                  <a:gd name="connsiteY1" fmla="*/ 88136 h 826266"/>
-                  <a:gd name="connsiteX2" fmla="*/ 1134737 w 1443209"/>
-                  <a:gd name="connsiteY2" fmla="*/ 550844 h 826266"/>
-                  <a:gd name="connsiteX3" fmla="*/ 1388125 w 1443209"/>
-                  <a:gd name="connsiteY3" fmla="*/ 275421 h 826266"/>
-                  <a:gd name="connsiteX4" fmla="*/ 1443209 w 1443209"/>
-                  <a:gd name="connsiteY4" fmla="*/ 0 h 826266"/>
-                  <a:gd name="connsiteX0" fmla="*/ 0 w 1465243"/>
-                  <a:gd name="connsiteY0" fmla="*/ 914401 h 914401"/>
-                  <a:gd name="connsiteX1" fmla="*/ 572877 w 1465243"/>
-                  <a:gd name="connsiteY1" fmla="*/ 176271 h 914401"/>
-                  <a:gd name="connsiteX2" fmla="*/ 1134737 w 1465243"/>
-                  <a:gd name="connsiteY2" fmla="*/ 638979 h 914401"/>
-                  <a:gd name="connsiteX3" fmla="*/ 1388125 w 1465243"/>
-                  <a:gd name="connsiteY3" fmla="*/ 363556 h 914401"/>
-                  <a:gd name="connsiteX4" fmla="*/ 1465243 w 1465243"/>
-                  <a:gd name="connsiteY4" fmla="*/ 0 h 914401"/>
+                  <a:gd name="connsiteX0" fmla="*/ 0 w 1145754"/>
+                  <a:gd name="connsiteY0" fmla="*/ 541243 h 685275"/>
+                  <a:gd name="connsiteX1" fmla="*/ 440675 w 1145754"/>
+                  <a:gd name="connsiteY1" fmla="*/ 1416 h 685275"/>
+                  <a:gd name="connsiteX2" fmla="*/ 826265 w 1145754"/>
+                  <a:gd name="connsiteY2" fmla="*/ 684462 h 685275"/>
+                  <a:gd name="connsiteX3" fmla="*/ 1145754 w 1145754"/>
+                  <a:gd name="connsiteY3" fmla="*/ 111585 h 685275"/>
                 </a:gdLst>
                 <a:ahLst/>
                 <a:cxnLst>
@@ -4960,35 +5120,27 @@
                   <a:cxn ang="0">
                     <a:pos x="connsiteX3" y="connsiteY3"/>
                   </a:cxn>
-                  <a:cxn ang="0">
-                    <a:pos x="connsiteX4" y="connsiteY4"/>
-                  </a:cxn>
                 </a:cxnLst>
                 <a:rect l="l" t="t" r="r" b="b"/>
                 <a:pathLst>
-                  <a:path w="1465243" h="914401">
+                  <a:path w="1145754" h="685275">
                     <a:moveTo>
-                      <a:pt x="0" y="914401"/>
+                      <a:pt x="0" y="541243"/>
                     </a:moveTo>
                     <a:cubicBezTo>
-                      <a:pt x="263487" y="421396"/>
-                      <a:pt x="383754" y="222175"/>
-                      <a:pt x="572877" y="176271"/>
+                      <a:pt x="151482" y="259394"/>
+                      <a:pt x="302964" y="-22454"/>
+                      <a:pt x="440675" y="1416"/>
                     </a:cubicBezTo>
                     <a:cubicBezTo>
-                      <a:pt x="762000" y="130367"/>
-                      <a:pt x="998862" y="607765"/>
-                      <a:pt x="1134737" y="638979"/>
+                      <a:pt x="578386" y="25286"/>
+                      <a:pt x="708752" y="666101"/>
+                      <a:pt x="826265" y="684462"/>
                     </a:cubicBezTo>
                     <a:cubicBezTo>
-                      <a:pt x="1270612" y="670193"/>
-                      <a:pt x="1356910" y="482906"/>
-                      <a:pt x="1388125" y="363556"/>
-                    </a:cubicBezTo>
-                    <a:cubicBezTo>
-                      <a:pt x="1430357" y="233190"/>
-                      <a:pt x="1430356" y="36723"/>
-                      <a:pt x="1465243" y="0"/>
+                      <a:pt x="943778" y="702823"/>
+                      <a:pt x="1044766" y="407204"/>
+                      <a:pt x="1145754" y="111585"/>
                     </a:cubicBezTo>
                   </a:path>
                 </a:pathLst>
@@ -4996,7 +5148,7 @@
               <a:noFill/>
               <a:ln w="57150">
                 <a:solidFill>
-                  <a:srgbClr val="13DF03"/>
+                  <a:srgbClr val="FFFF00"/>
                 </a:solidFill>
                 <a:headEnd type="oval"/>
               </a:ln>
@@ -5022,24 +5174,20 @@
               <a:lstStyle/>
               <a:p>
                 <a:pPr algn="ctr"/>
-                <a:endParaRPr lang="en-CA">
-                  <a:solidFill>
-                    <a:srgbClr val="13DF03"/>
-                  </a:solidFill>
-                </a:endParaRPr>
+                <a:endParaRPr lang="en-CA"/>
               </a:p>
             </p:txBody>
           </p:sp>
           <p:sp>
             <p:nvSpPr>
-              <p:cNvPr id="12" name="TextBox 11"/>
+              <p:cNvPr id="15" name="TextBox 14"/>
               <p:cNvSpPr txBox="1"/>
               <p:nvPr/>
             </p:nvSpPr>
             <p:spPr>
               <a:xfrm>
-                <a:off x="6720288" y="358049"/>
-                <a:ext cx="3525398" cy="1200329"/>
+                <a:off x="8141465" y="3876568"/>
+                <a:ext cx="1839816" cy="1200329"/>
               </a:xfrm>
               <a:prstGeom prst="rect">
                 <a:avLst/>
@@ -5055,42 +5203,45 @@
                 <a:r>
                   <a:rPr lang="en-CA" sz="3600" dirty="0" smtClean="0">
                     <a:solidFill>
-                      <a:srgbClr val="13DF03"/>
+                      <a:srgbClr val="FFFF00"/>
                     </a:solidFill>
                   </a:rPr>
-                  <a:t>Superior articular process</a:t>
+                  <a:t>Spinous </a:t>
                 </a:r>
-                <a:endParaRPr lang="en-CA" sz="3600" dirty="0">
-                  <a:solidFill>
-                    <a:srgbClr val="13DF03"/>
-                  </a:solidFill>
-                </a:endParaRPr>
+                <a:r>
+                  <a:rPr lang="en-CA" sz="3600" dirty="0">
+                    <a:solidFill>
+                      <a:srgbClr val="FFFF00"/>
+                    </a:solidFill>
+                  </a:rPr>
+                  <a:t>process</a:t>
+                </a:r>
               </a:p>
             </p:txBody>
           </p:sp>
         </p:grpSp>
         <p:sp>
           <p:nvSpPr>
-            <p:cNvPr id="14" name="Freeform 13"/>
+            <p:cNvPr id="2" name="Freeform 1"/>
             <p:cNvSpPr/>
             <p:nvPr/>
           </p:nvSpPr>
           <p:spPr>
             <a:xfrm>
-              <a:off x="7568588" y="4879056"/>
-              <a:ext cx="1145754" cy="685275"/>
+              <a:off x="6071286" y="3838832"/>
+              <a:ext cx="724948" cy="2331309"/>
             </a:xfrm>
             <a:custGeom>
               <a:avLst/>
               <a:gdLst>
-                <a:gd name="connsiteX0" fmla="*/ 0 w 1145754"/>
-                <a:gd name="connsiteY0" fmla="*/ 541243 h 685275"/>
-                <a:gd name="connsiteX1" fmla="*/ 440675 w 1145754"/>
-                <a:gd name="connsiteY1" fmla="*/ 1416 h 685275"/>
-                <a:gd name="connsiteX2" fmla="*/ 826265 w 1145754"/>
-                <a:gd name="connsiteY2" fmla="*/ 684462 h 685275"/>
-                <a:gd name="connsiteX3" fmla="*/ 1145754 w 1145754"/>
-                <a:gd name="connsiteY3" fmla="*/ 111585 h 685275"/>
+                <a:gd name="connsiteX0" fmla="*/ 0 w 724948"/>
+                <a:gd name="connsiteY0" fmla="*/ 0 h 2331309"/>
+                <a:gd name="connsiteX1" fmla="*/ 724930 w 724948"/>
+                <a:gd name="connsiteY1" fmla="*/ 1474573 h 2331309"/>
+                <a:gd name="connsiteX2" fmla="*/ 24714 w 724948"/>
+                <a:gd name="connsiteY2" fmla="*/ 1301579 h 2331309"/>
+                <a:gd name="connsiteX3" fmla="*/ 518984 w 724948"/>
+                <a:gd name="connsiteY3" fmla="*/ 2331309 h 2331309"/>
               </a:gdLst>
               <a:ahLst/>
               <a:cxnLst>
@@ -5109,24 +5260,24 @@
               </a:cxnLst>
               <a:rect l="l" t="t" r="r" b="b"/>
               <a:pathLst>
-                <a:path w="1145754" h="685275">
+                <a:path w="724948" h="2331309">
                   <a:moveTo>
-                    <a:pt x="0" y="541243"/>
+                    <a:pt x="0" y="0"/>
                   </a:moveTo>
                   <a:cubicBezTo>
-                    <a:pt x="151482" y="259394"/>
-                    <a:pt x="302964" y="-22454"/>
-                    <a:pt x="440675" y="1416"/>
+                    <a:pt x="360405" y="628821"/>
+                    <a:pt x="720811" y="1257643"/>
+                    <a:pt x="724930" y="1474573"/>
                   </a:cubicBezTo>
                   <a:cubicBezTo>
-                    <a:pt x="578386" y="25286"/>
-                    <a:pt x="708752" y="666101"/>
-                    <a:pt x="826265" y="684462"/>
+                    <a:pt x="729049" y="1691503"/>
+                    <a:pt x="59038" y="1158790"/>
+                    <a:pt x="24714" y="1301579"/>
                   </a:cubicBezTo>
                   <a:cubicBezTo>
-                    <a:pt x="943778" y="702823"/>
-                    <a:pt x="1044766" y="407204"/>
-                    <a:pt x="1145754" y="111585"/>
+                    <a:pt x="-9610" y="1444368"/>
+                    <a:pt x="254687" y="1887838"/>
+                    <a:pt x="518984" y="2331309"/>
                   </a:cubicBezTo>
                 </a:path>
               </a:pathLst>
@@ -5134,7 +5285,7 @@
             <a:noFill/>
             <a:ln w="57150">
               <a:solidFill>
-                <a:srgbClr val="FFFF00"/>
+                <a:srgbClr val="FFC000"/>
               </a:solidFill>
               <a:headEnd type="oval"/>
             </a:ln>
@@ -5166,14 +5317,14 @@
         </p:sp>
         <p:sp>
           <p:nvSpPr>
-            <p:cNvPr id="15" name="TextBox 14"/>
+            <p:cNvPr id="3" name="TextBox 2"/>
             <p:cNvSpPr txBox="1"/>
             <p:nvPr/>
           </p:nvSpPr>
           <p:spPr>
             <a:xfrm>
-              <a:off x="8141465" y="3876568"/>
-              <a:ext cx="1839816" cy="1200329"/>
+              <a:off x="6246564" y="6092889"/>
+              <a:ext cx="1634319" cy="646331"/>
             </a:xfrm>
             <a:prstGeom prst="rect">
               <a:avLst/>
@@ -5189,19 +5340,16 @@
               <a:r>
                 <a:rPr lang="en-CA" sz="3600" dirty="0" smtClean="0">
                   <a:solidFill>
-                    <a:srgbClr val="FFFF00"/>
+                    <a:srgbClr val="FFC000"/>
                   </a:solidFill>
                 </a:rPr>
-                <a:t>Spinous </a:t>
+                <a:t>Lamina</a:t>
               </a:r>
-              <a:r>
-                <a:rPr lang="en-CA" sz="3600" dirty="0">
-                  <a:solidFill>
-                    <a:srgbClr val="FFFF00"/>
-                  </a:solidFill>
-                </a:rPr>
-                <a:t>process</a:t>
-              </a:r>
+              <a:endParaRPr lang="en-CA" sz="2000" dirty="0">
+                <a:solidFill>
+                  <a:srgbClr val="FFC000"/>
+                </a:solidFill>
+              </a:endParaRPr>
             </a:p>
           </p:txBody>
         </p:sp>

</xml_diff>

<commit_message>
CISC 874 Final Report/Presnetation - Finalized and printed
</commit_message>
<xml_diff>
--- a/CISC897/FinalSurvey/Paper/Images/ImageGeneration.pptx
+++ b/CISC897/FinalSurvey/Paper/Images/ImageGeneration.pptx
@@ -7,9 +7,10 @@
   <p:sldIdLst>
     <p:sldId id="257" r:id="rId2"/>
     <p:sldId id="258" r:id="rId3"/>
-    <p:sldId id="259" r:id="rId4"/>
-    <p:sldId id="260" r:id="rId5"/>
-    <p:sldId id="261" r:id="rId6"/>
+    <p:sldId id="262" r:id="rId4"/>
+    <p:sldId id="259" r:id="rId5"/>
+    <p:sldId id="260" r:id="rId6"/>
+    <p:sldId id="261" r:id="rId7"/>
   </p:sldIdLst>
   <p:sldSz cx="12192000" cy="6858000"/>
   <p:notesSz cx="6858000" cy="9144000"/>
@@ -247,7 +248,7 @@
           <a:p>
             <a:fld id="{B0391C92-2A1D-4281-A91D-582B82F483F6}" type="datetimeFigureOut">
               <a:rPr lang="en-CA" smtClean="0"/>
-              <a:t>21/11/2016</a:t>
+              <a:t>27/11/2016</a:t>
             </a:fld>
             <a:endParaRPr lang="en-CA"/>
           </a:p>
@@ -417,7 +418,7 @@
           <a:p>
             <a:fld id="{B0391C92-2A1D-4281-A91D-582B82F483F6}" type="datetimeFigureOut">
               <a:rPr lang="en-CA" smtClean="0"/>
-              <a:t>21/11/2016</a:t>
+              <a:t>27/11/2016</a:t>
             </a:fld>
             <a:endParaRPr lang="en-CA"/>
           </a:p>
@@ -597,7 +598,7 @@
           <a:p>
             <a:fld id="{B0391C92-2A1D-4281-A91D-582B82F483F6}" type="datetimeFigureOut">
               <a:rPr lang="en-CA" smtClean="0"/>
-              <a:t>21/11/2016</a:t>
+              <a:t>27/11/2016</a:t>
             </a:fld>
             <a:endParaRPr lang="en-CA"/>
           </a:p>
@@ -767,7 +768,7 @@
           <a:p>
             <a:fld id="{B0391C92-2A1D-4281-A91D-582B82F483F6}" type="datetimeFigureOut">
               <a:rPr lang="en-CA" smtClean="0"/>
-              <a:t>21/11/2016</a:t>
+              <a:t>27/11/2016</a:t>
             </a:fld>
             <a:endParaRPr lang="en-CA"/>
           </a:p>
@@ -1013,7 +1014,7 @@
           <a:p>
             <a:fld id="{B0391C92-2A1D-4281-A91D-582B82F483F6}" type="datetimeFigureOut">
               <a:rPr lang="en-CA" smtClean="0"/>
-              <a:t>21/11/2016</a:t>
+              <a:t>27/11/2016</a:t>
             </a:fld>
             <a:endParaRPr lang="en-CA"/>
           </a:p>
@@ -1245,7 +1246,7 @@
           <a:p>
             <a:fld id="{B0391C92-2A1D-4281-A91D-582B82F483F6}" type="datetimeFigureOut">
               <a:rPr lang="en-CA" smtClean="0"/>
-              <a:t>21/11/2016</a:t>
+              <a:t>27/11/2016</a:t>
             </a:fld>
             <a:endParaRPr lang="en-CA"/>
           </a:p>
@@ -1612,7 +1613,7 @@
           <a:p>
             <a:fld id="{B0391C92-2A1D-4281-A91D-582B82F483F6}" type="datetimeFigureOut">
               <a:rPr lang="en-CA" smtClean="0"/>
-              <a:t>21/11/2016</a:t>
+              <a:t>27/11/2016</a:t>
             </a:fld>
             <a:endParaRPr lang="en-CA"/>
           </a:p>
@@ -1730,7 +1731,7 @@
           <a:p>
             <a:fld id="{B0391C92-2A1D-4281-A91D-582B82F483F6}" type="datetimeFigureOut">
               <a:rPr lang="en-CA" smtClean="0"/>
-              <a:t>21/11/2016</a:t>
+              <a:t>27/11/2016</a:t>
             </a:fld>
             <a:endParaRPr lang="en-CA"/>
           </a:p>
@@ -1825,7 +1826,7 @@
           <a:p>
             <a:fld id="{B0391C92-2A1D-4281-A91D-582B82F483F6}" type="datetimeFigureOut">
               <a:rPr lang="en-CA" smtClean="0"/>
-              <a:t>21/11/2016</a:t>
+              <a:t>27/11/2016</a:t>
             </a:fld>
             <a:endParaRPr lang="en-CA"/>
           </a:p>
@@ -2102,7 +2103,7 @@
           <a:p>
             <a:fld id="{B0391C92-2A1D-4281-A91D-582B82F483F6}" type="datetimeFigureOut">
               <a:rPr lang="en-CA" smtClean="0"/>
-              <a:t>21/11/2016</a:t>
+              <a:t>27/11/2016</a:t>
             </a:fld>
             <a:endParaRPr lang="en-CA"/>
           </a:p>
@@ -2355,7 +2356,7 @@
           <a:p>
             <a:fld id="{B0391C92-2A1D-4281-A91D-582B82F483F6}" type="datetimeFigureOut">
               <a:rPr lang="en-CA" smtClean="0"/>
-              <a:t>21/11/2016</a:t>
+              <a:t>27/11/2016</a:t>
             </a:fld>
             <a:endParaRPr lang="en-CA"/>
           </a:p>
@@ -2568,7 +2569,7 @@
           <a:p>
             <a:fld id="{B0391C92-2A1D-4281-A91D-582B82F483F6}" type="datetimeFigureOut">
               <a:rPr lang="en-CA" smtClean="0"/>
-              <a:t>21/11/2016</a:t>
+              <a:t>27/11/2016</a:t>
             </a:fld>
             <a:endParaRPr lang="en-CA"/>
           </a:p>
@@ -4369,6 +4370,197 @@
       </p:grpSpPr>
       <p:grpSp>
         <p:nvGrpSpPr>
+          <p:cNvPr id="8" name="Group 7"/>
+          <p:cNvGrpSpPr/>
+          <p:nvPr/>
+        </p:nvGrpSpPr>
+        <p:grpSpPr>
+          <a:xfrm>
+            <a:off x="3820108" y="189469"/>
+            <a:ext cx="3956411" cy="6483179"/>
+            <a:chOff x="3820108" y="189469"/>
+            <a:chExt cx="3956411" cy="6483179"/>
+          </a:xfrm>
+        </p:grpSpPr>
+        <p:pic>
+          <p:nvPicPr>
+            <p:cNvPr id="2" name="Picture 1"/>
+            <p:cNvPicPr>
+              <a:picLocks noChangeAspect="1"/>
+            </p:cNvPicPr>
+            <p:nvPr/>
+          </p:nvPicPr>
+          <p:blipFill rotWithShape="1">
+            <a:blip r:embed="rId2">
+              <a:extLst>
+                <a:ext uri="{28A0092B-C50C-407E-A947-70E740481C1C}">
+                  <a14:useLocalDpi xmlns:a14="http://schemas.microsoft.com/office/drawing/2010/main" val="0"/>
+                </a:ext>
+              </a:extLst>
+            </a:blip>
+            <a:srcRect l="27008" t="2764" r="26895" b="2703"/>
+            <a:stretch/>
+          </p:blipFill>
+          <p:spPr>
+            <a:xfrm>
+              <a:off x="4423719" y="189469"/>
+              <a:ext cx="3352800" cy="6483179"/>
+            </a:xfrm>
+            <a:prstGeom prst="rect">
+              <a:avLst/>
+            </a:prstGeom>
+          </p:spPr>
+        </p:pic>
+        <p:cxnSp>
+          <p:nvCxnSpPr>
+            <p:cNvPr id="4" name="Straight Connector 3"/>
+            <p:cNvCxnSpPr/>
+            <p:nvPr/>
+          </p:nvCxnSpPr>
+          <p:spPr>
+            <a:xfrm flipH="1">
+              <a:off x="4604951" y="1449859"/>
+              <a:ext cx="1631092" cy="617838"/>
+            </a:xfrm>
+            <a:prstGeom prst="line">
+              <a:avLst/>
+            </a:prstGeom>
+            <a:ln w="38100">
+              <a:solidFill>
+                <a:srgbClr val="FF0000"/>
+              </a:solidFill>
+            </a:ln>
+          </p:spPr>
+          <p:style>
+            <a:lnRef idx="1">
+              <a:schemeClr val="accent1"/>
+            </a:lnRef>
+            <a:fillRef idx="0">
+              <a:schemeClr val="accent1"/>
+            </a:fillRef>
+            <a:effectRef idx="0">
+              <a:schemeClr val="accent1"/>
+            </a:effectRef>
+            <a:fontRef idx="minor">
+              <a:schemeClr val="tx1"/>
+            </a:fontRef>
+          </p:style>
+        </p:cxnSp>
+        <p:cxnSp>
+          <p:nvCxnSpPr>
+            <p:cNvPr id="6" name="Straight Connector 5"/>
+            <p:cNvCxnSpPr/>
+            <p:nvPr/>
+          </p:nvCxnSpPr>
+          <p:spPr>
+            <a:xfrm flipH="1" flipV="1">
+              <a:off x="4631722" y="3072715"/>
+              <a:ext cx="1429265" cy="576648"/>
+            </a:xfrm>
+            <a:prstGeom prst="line">
+              <a:avLst/>
+            </a:prstGeom>
+            <a:ln w="38100">
+              <a:solidFill>
+                <a:srgbClr val="FF0000"/>
+              </a:solidFill>
+            </a:ln>
+          </p:spPr>
+          <p:style>
+            <a:lnRef idx="1">
+              <a:schemeClr val="accent1"/>
+            </a:lnRef>
+            <a:fillRef idx="0">
+              <a:schemeClr val="accent1"/>
+            </a:fillRef>
+            <a:effectRef idx="0">
+              <a:schemeClr val="accent1"/>
+            </a:effectRef>
+            <a:fontRef idx="minor">
+              <a:schemeClr val="tx1"/>
+            </a:fontRef>
+          </p:style>
+        </p:cxnSp>
+        <p:sp>
+          <p:nvSpPr>
+            <p:cNvPr id="7" name="Arc 6"/>
+            <p:cNvSpPr/>
+            <p:nvPr/>
+          </p:nvSpPr>
+          <p:spPr>
+            <a:xfrm rot="2358854">
+              <a:off x="3820108" y="1939393"/>
+              <a:ext cx="1322550" cy="1523940"/>
+            </a:xfrm>
+            <a:prstGeom prst="arc">
+              <a:avLst>
+                <a:gd name="adj1" fmla="val 15234082"/>
+                <a:gd name="adj2" fmla="val 399765"/>
+              </a:avLst>
+            </a:prstGeom>
+            <a:ln w="38100">
+              <a:solidFill>
+                <a:srgbClr val="FF0000"/>
+              </a:solidFill>
+              <a:prstDash val="sysDash"/>
+            </a:ln>
+          </p:spPr>
+          <p:style>
+            <a:lnRef idx="1">
+              <a:schemeClr val="accent1"/>
+            </a:lnRef>
+            <a:fillRef idx="0">
+              <a:schemeClr val="accent1"/>
+            </a:fillRef>
+            <a:effectRef idx="0">
+              <a:schemeClr val="accent1"/>
+            </a:effectRef>
+            <a:fontRef idx="minor">
+              <a:schemeClr val="tx1"/>
+            </a:fontRef>
+          </p:style>
+          <p:txBody>
+            <a:bodyPr rtlCol="0" anchor="ctr"/>
+            <a:lstStyle/>
+            <a:p>
+              <a:pPr algn="ctr"/>
+              <a:endParaRPr lang="en-CA"/>
+            </a:p>
+          </p:txBody>
+        </p:sp>
+      </p:grpSp>
+    </p:spTree>
+    <p:extLst>
+      <p:ext uri="{BB962C8B-B14F-4D97-AF65-F5344CB8AC3E}">
+        <p14:creationId xmlns:p14="http://schemas.microsoft.com/office/powerpoint/2010/main" val="1262588436"/>
+      </p:ext>
+    </p:extLst>
+  </p:cSld>
+  <p:clrMapOvr>
+    <a:masterClrMapping/>
+  </p:clrMapOvr>
+</p:sld>
+</file>
+
+<file path=ppt/slides/slide4.xml><?xml version="1.0" encoding="utf-8"?>
+<p:sld xmlns:a="http://schemas.openxmlformats.org/drawingml/2006/main" xmlns:r="http://schemas.openxmlformats.org/officeDocument/2006/relationships" xmlns:p="http://schemas.openxmlformats.org/presentationml/2006/main">
+  <p:cSld>
+    <p:spTree>
+      <p:nvGrpSpPr>
+        <p:cNvPr id="1" name=""/>
+        <p:cNvGrpSpPr/>
+        <p:nvPr/>
+      </p:nvGrpSpPr>
+      <p:grpSpPr>
+        <a:xfrm>
+          <a:off x="0" y="0"/>
+          <a:ext cx="0" cy="0"/>
+          <a:chOff x="0" y="0"/>
+          <a:chExt cx="0" cy="0"/>
+        </a:xfrm>
+      </p:grpSpPr>
+      <p:grpSp>
+        <p:nvGrpSpPr>
           <p:cNvPr id="7" name="Group 6"/>
           <p:cNvGrpSpPr/>
           <p:nvPr/>
@@ -5367,7 +5559,7 @@
 </p:sld>
 </file>
 
-<file path=ppt/slides/slide4.xml><?xml version="1.0" encoding="utf-8"?>
+<file path=ppt/slides/slide5.xml><?xml version="1.0" encoding="utf-8"?>
 <p:sld xmlns:a="http://schemas.openxmlformats.org/drawingml/2006/main" xmlns:r="http://schemas.openxmlformats.org/officeDocument/2006/relationships" xmlns:p="http://schemas.openxmlformats.org/presentationml/2006/main">
   <p:cSld>
     <p:spTree>
@@ -5639,7 +5831,7 @@
 </p:sld>
 </file>
 
-<file path=ppt/slides/slide5.xml><?xml version="1.0" encoding="utf-8"?>
+<file path=ppt/slides/slide6.xml><?xml version="1.0" encoding="utf-8"?>
 <p:sld xmlns:a="http://schemas.openxmlformats.org/drawingml/2006/main" xmlns:r="http://schemas.openxmlformats.org/officeDocument/2006/relationships" xmlns:p="http://schemas.openxmlformats.org/presentationml/2006/main">
   <p:cSld>
     <p:spTree>

</xml_diff>

<commit_message>
Synch before leaving office
</commit_message>
<xml_diff>
--- a/CISC897/FinalSurvey/Paper/Images/ImageGeneration.pptx
+++ b/CISC897/FinalSurvey/Paper/Images/ImageGeneration.pptx
@@ -248,7 +248,7 @@
           <a:p>
             <a:fld id="{B0391C92-2A1D-4281-A91D-582B82F483F6}" type="datetimeFigureOut">
               <a:rPr lang="en-CA" smtClean="0"/>
-              <a:t>27/11/2016</a:t>
+              <a:t>2016-11-30</a:t>
             </a:fld>
             <a:endParaRPr lang="en-CA"/>
           </a:p>
@@ -418,7 +418,7 @@
           <a:p>
             <a:fld id="{B0391C92-2A1D-4281-A91D-582B82F483F6}" type="datetimeFigureOut">
               <a:rPr lang="en-CA" smtClean="0"/>
-              <a:t>27/11/2016</a:t>
+              <a:t>2016-11-30</a:t>
             </a:fld>
             <a:endParaRPr lang="en-CA"/>
           </a:p>
@@ -598,7 +598,7 @@
           <a:p>
             <a:fld id="{B0391C92-2A1D-4281-A91D-582B82F483F6}" type="datetimeFigureOut">
               <a:rPr lang="en-CA" smtClean="0"/>
-              <a:t>27/11/2016</a:t>
+              <a:t>2016-11-30</a:t>
             </a:fld>
             <a:endParaRPr lang="en-CA"/>
           </a:p>
@@ -768,7 +768,7 @@
           <a:p>
             <a:fld id="{B0391C92-2A1D-4281-A91D-582B82F483F6}" type="datetimeFigureOut">
               <a:rPr lang="en-CA" smtClean="0"/>
-              <a:t>27/11/2016</a:t>
+              <a:t>2016-11-30</a:t>
             </a:fld>
             <a:endParaRPr lang="en-CA"/>
           </a:p>
@@ -1014,7 +1014,7 @@
           <a:p>
             <a:fld id="{B0391C92-2A1D-4281-A91D-582B82F483F6}" type="datetimeFigureOut">
               <a:rPr lang="en-CA" smtClean="0"/>
-              <a:t>27/11/2016</a:t>
+              <a:t>2016-11-30</a:t>
             </a:fld>
             <a:endParaRPr lang="en-CA"/>
           </a:p>
@@ -1246,7 +1246,7 @@
           <a:p>
             <a:fld id="{B0391C92-2A1D-4281-A91D-582B82F483F6}" type="datetimeFigureOut">
               <a:rPr lang="en-CA" smtClean="0"/>
-              <a:t>27/11/2016</a:t>
+              <a:t>2016-11-30</a:t>
             </a:fld>
             <a:endParaRPr lang="en-CA"/>
           </a:p>
@@ -1613,7 +1613,7 @@
           <a:p>
             <a:fld id="{B0391C92-2A1D-4281-A91D-582B82F483F6}" type="datetimeFigureOut">
               <a:rPr lang="en-CA" smtClean="0"/>
-              <a:t>27/11/2016</a:t>
+              <a:t>2016-11-30</a:t>
             </a:fld>
             <a:endParaRPr lang="en-CA"/>
           </a:p>
@@ -1731,7 +1731,7 @@
           <a:p>
             <a:fld id="{B0391C92-2A1D-4281-A91D-582B82F483F6}" type="datetimeFigureOut">
               <a:rPr lang="en-CA" smtClean="0"/>
-              <a:t>27/11/2016</a:t>
+              <a:t>2016-11-30</a:t>
             </a:fld>
             <a:endParaRPr lang="en-CA"/>
           </a:p>
@@ -1826,7 +1826,7 @@
           <a:p>
             <a:fld id="{B0391C92-2A1D-4281-A91D-582B82F483F6}" type="datetimeFigureOut">
               <a:rPr lang="en-CA" smtClean="0"/>
-              <a:t>27/11/2016</a:t>
+              <a:t>2016-11-30</a:t>
             </a:fld>
             <a:endParaRPr lang="en-CA"/>
           </a:p>
@@ -2103,7 +2103,7 @@
           <a:p>
             <a:fld id="{B0391C92-2A1D-4281-A91D-582B82F483F6}" type="datetimeFigureOut">
               <a:rPr lang="en-CA" smtClean="0"/>
-              <a:t>27/11/2016</a:t>
+              <a:t>2016-11-30</a:t>
             </a:fld>
             <a:endParaRPr lang="en-CA"/>
           </a:p>
@@ -2356,7 +2356,7 @@
           <a:p>
             <a:fld id="{B0391C92-2A1D-4281-A91D-582B82F483F6}" type="datetimeFigureOut">
               <a:rPr lang="en-CA" smtClean="0"/>
-              <a:t>27/11/2016</a:t>
+              <a:t>2016-11-30</a:t>
             </a:fld>
             <a:endParaRPr lang="en-CA"/>
           </a:p>
@@ -2569,7 +2569,7 @@
           <a:p>
             <a:fld id="{B0391C92-2A1D-4281-A91D-582B82F483F6}" type="datetimeFigureOut">
               <a:rPr lang="en-CA" smtClean="0"/>
-              <a:t>27/11/2016</a:t>
+              <a:t>2016-11-30</a:t>
             </a:fld>
             <a:endParaRPr lang="en-CA"/>
           </a:p>
@@ -4709,7 +4709,7 @@
                   <a:noFill/>
                   <a:ln w="57150">
                     <a:solidFill>
-                      <a:srgbClr val="FF0000"/>
+                      <a:srgbClr val="00B0F0"/>
                     </a:solidFill>
                     <a:headEnd type="oval"/>
                   </a:ln>
@@ -4754,6 +4754,9 @@
                     <a:avLst/>
                   </a:prstGeom>
                   <a:noFill/>
+                  <a:ln>
+                    <a:noFill/>
+                  </a:ln>
                 </p:spPr>
                 <p:txBody>
                   <a:bodyPr wrap="square" rtlCol="0">
@@ -4763,15 +4766,25 @@
                   <a:p>
                     <a:r>
                       <a:rPr lang="en-CA" sz="3600" dirty="0" smtClean="0">
+                        <a:ln>
+                          <a:solidFill>
+                            <a:srgbClr val="00B0F0"/>
+                          </a:solidFill>
+                        </a:ln>
                         <a:solidFill>
-                          <a:srgbClr val="FF0000"/>
+                          <a:srgbClr val="00B0F0"/>
                         </a:solidFill>
                       </a:rPr>
                       <a:t>Transverse process</a:t>
                     </a:r>
                     <a:endParaRPr lang="en-CA" sz="3600" dirty="0">
+                      <a:ln>
+                        <a:solidFill>
+                          <a:srgbClr val="00B0F0"/>
+                        </a:solidFill>
+                      </a:ln>
                       <a:solidFill>
-                        <a:srgbClr val="FF0000"/>
+                        <a:srgbClr val="00B0F0"/>
                       </a:solidFill>
                     </a:endParaRPr>
                   </a:p>
@@ -4802,14 +4815,14 @@
                     <a:r>
                       <a:rPr lang="en-CA" sz="3600" dirty="0" smtClean="0">
                         <a:solidFill>
-                          <a:srgbClr val="00B0F0"/>
+                          <a:srgbClr val="FF0000"/>
                         </a:solidFill>
                       </a:rPr>
                       <a:t>Superior vertebral endplate</a:t>
                     </a:r>
                     <a:endParaRPr lang="en-CA" sz="3600" dirty="0">
                       <a:solidFill>
-                        <a:srgbClr val="00B0F0"/>
+                        <a:srgbClr val="FF0000"/>
                       </a:solidFill>
                     </a:endParaRPr>
                   </a:p>
@@ -4984,7 +4997,7 @@
                   <a:noFill/>
                   <a:ln w="57150">
                     <a:solidFill>
-                      <a:srgbClr val="00B0F0"/>
+                      <a:srgbClr val="FF0000"/>
                     </a:solidFill>
                     <a:headEnd type="oval"/>
                   </a:ln>
@@ -7191,14 +7204,14 @@
               <a:r>
                 <a:rPr lang="en-CA" sz="4000" dirty="0" smtClean="0">
                   <a:solidFill>
-                    <a:srgbClr val="00B0F0"/>
+                    <a:srgbClr val="FFFF00"/>
                   </a:solidFill>
                 </a:rPr>
                 <a:t>Spinous process</a:t>
               </a:r>
               <a:endParaRPr lang="en-CA" sz="4000" dirty="0">
                 <a:solidFill>
-                  <a:srgbClr val="00B0F0"/>
+                  <a:srgbClr val="FFFF00"/>
                 </a:solidFill>
               </a:endParaRPr>
             </a:p>
@@ -7269,7 +7282,7 @@
             <a:noFill/>
             <a:ln w="57150">
               <a:solidFill>
-                <a:srgbClr val="00B0F0"/>
+                <a:srgbClr val="FFFF00"/>
               </a:solidFill>
               <a:headEnd type="triangle"/>
             </a:ln>
@@ -7324,14 +7337,14 @@
               <a:r>
                 <a:rPr lang="en-CA" sz="4000" dirty="0" smtClean="0">
                   <a:solidFill>
-                    <a:srgbClr val="13DF03"/>
+                    <a:srgbClr val="00B0F0"/>
                   </a:solidFill>
                 </a:rPr>
                 <a:t>Transverse process</a:t>
               </a:r>
               <a:endParaRPr lang="en-CA" sz="4000" dirty="0">
                 <a:solidFill>
-                  <a:srgbClr val="13DF03"/>
+                  <a:srgbClr val="00B0F0"/>
                 </a:solidFill>
               </a:endParaRPr>
             </a:p>
@@ -7402,7 +7415,7 @@
             <a:noFill/>
             <a:ln w="57150">
               <a:solidFill>
-                <a:srgbClr val="13DF03"/>
+                <a:srgbClr val="00B0F0"/>
               </a:solidFill>
               <a:headEnd type="triangle"/>
             </a:ln>
@@ -7585,7 +7598,7 @@
             <a:noFill/>
             <a:ln w="57150">
               <a:solidFill>
-                <a:srgbClr val="13DF03"/>
+                <a:srgbClr val="00B0F0"/>
               </a:solidFill>
               <a:headEnd type="triangle"/>
             </a:ln>
@@ -7645,14 +7658,14 @@
               <a:r>
                 <a:rPr lang="en-CA" sz="4000" dirty="0" smtClean="0">
                   <a:solidFill>
-                    <a:srgbClr val="FFFF00"/>
+                    <a:srgbClr val="13DF03"/>
                   </a:solidFill>
                 </a:rPr>
                 <a:t>Superior articular process</a:t>
               </a:r>
               <a:endParaRPr lang="en-CA" sz="4000" dirty="0">
                 <a:solidFill>
-                  <a:srgbClr val="FFFF00"/>
+                  <a:srgbClr val="13DF03"/>
                 </a:solidFill>
               </a:endParaRPr>
             </a:p>
@@ -7827,7 +7840,7 @@
             <a:noFill/>
             <a:ln w="57150">
               <a:solidFill>
-                <a:srgbClr val="FFFF00"/>
+                <a:srgbClr val="13DF03"/>
               </a:solidFill>
               <a:headEnd type="triangle"/>
             </a:ln>
@@ -7930,7 +7943,7 @@
             <a:noFill/>
             <a:ln w="57150">
               <a:solidFill>
-                <a:srgbClr val="FFFF00"/>
+                <a:srgbClr val="13DF03"/>
               </a:solidFill>
               <a:headEnd type="triangle"/>
             </a:ln>

</xml_diff>